<commit_message>
Adding lecture sides from 3/10.  Cleaning up slides from 2/10.
</commit_message>
<xml_diff>
--- a/Lectures/CS235 - UI Design - Lecture #06 - 2015.02.10.pptx
+++ b/Lectures/CS235 - UI Design - Lecture #06 - 2015.02.10.pptx
@@ -5,29 +5,28 @@
     <p:sldMasterId id="2147483705" r:id="rId1"/>
   </p:sldMasterIdLst>
   <p:notesMasterIdLst>
-    <p:notesMasterId r:id="rId19"/>
+    <p:notesMasterId r:id="rId18"/>
   </p:notesMasterIdLst>
   <p:handoutMasterIdLst>
-    <p:handoutMasterId r:id="rId20"/>
+    <p:handoutMasterId r:id="rId19"/>
   </p:handoutMasterIdLst>
   <p:sldIdLst>
     <p:sldId id="256" r:id="rId2"/>
-    <p:sldId id="257" r:id="rId3"/>
-    <p:sldId id="258" r:id="rId4"/>
-    <p:sldId id="263" r:id="rId5"/>
-    <p:sldId id="259" r:id="rId6"/>
-    <p:sldId id="266" r:id="rId7"/>
-    <p:sldId id="267" r:id="rId8"/>
-    <p:sldId id="268" r:id="rId9"/>
-    <p:sldId id="260" r:id="rId10"/>
-    <p:sldId id="265" r:id="rId11"/>
-    <p:sldId id="261" r:id="rId12"/>
-    <p:sldId id="273" r:id="rId13"/>
-    <p:sldId id="264" r:id="rId14"/>
-    <p:sldId id="269" r:id="rId15"/>
-    <p:sldId id="270" r:id="rId16"/>
-    <p:sldId id="271" r:id="rId17"/>
-    <p:sldId id="272" r:id="rId18"/>
+    <p:sldId id="258" r:id="rId3"/>
+    <p:sldId id="263" r:id="rId4"/>
+    <p:sldId id="259" r:id="rId5"/>
+    <p:sldId id="266" r:id="rId6"/>
+    <p:sldId id="267" r:id="rId7"/>
+    <p:sldId id="268" r:id="rId8"/>
+    <p:sldId id="260" r:id="rId9"/>
+    <p:sldId id="265" r:id="rId10"/>
+    <p:sldId id="261" r:id="rId11"/>
+    <p:sldId id="273" r:id="rId12"/>
+    <p:sldId id="264" r:id="rId13"/>
+    <p:sldId id="269" r:id="rId14"/>
+    <p:sldId id="270" r:id="rId15"/>
+    <p:sldId id="271" r:id="rId16"/>
+    <p:sldId id="272" r:id="rId17"/>
   </p:sldIdLst>
   <p:sldSz cx="9144000" cy="6858000" type="screen4x3"/>
   <p:notesSz cx="6858000" cy="9144000"/>
@@ -211,7 +210,8 @@
           <a:p>
             <a:fld id="{EE2F32F4-BD83-154C-AA9A-4D82CA5BD784}" type="datetimeFigureOut">
               <a:rPr lang="en-US" smtClean="0"/>
-              <a:t>2/8/15</a:t>
+              <a:pPr/>
+              <a:t>3/15/2015</a:t>
             </a:fld>
             <a:endParaRPr lang="en-US"/>
           </a:p>
@@ -277,6 +277,7 @@
           <a:p>
             <a:fld id="{A431F44B-648A-964B-BD01-F8E1B2AC0175}" type="slidenum">
               <a:rPr lang="en-US" smtClean="0"/>
+              <a:pPr/>
               <a:t>‹#›</a:t>
             </a:fld>
             <a:endParaRPr lang="en-US"/>
@@ -286,7 +287,7 @@
     </p:spTree>
     <p:extLst>
       <p:ext uri="{BB962C8B-B14F-4D97-AF65-F5344CB8AC3E}">
-        <p14:creationId xmlns:p14="http://schemas.microsoft.com/office/powerpoint/2010/main" val="4125462360"/>
+        <p14:creationId xmlns:p14="http://schemas.microsoft.com/office/powerpoint/2010/main" xmlns="" val="4125462360"/>
       </p:ext>
     </p:extLst>
   </p:cSld>
@@ -377,7 +378,8 @@
           <a:p>
             <a:fld id="{55D0D1FF-877A-1547-9B12-3172CA3B27A0}" type="datetimeFigureOut">
               <a:rPr lang="en-US" smtClean="0"/>
-              <a:t>2/8/15</a:t>
+              <a:pPr/>
+              <a:t>3/15/2015</a:t>
             </a:fld>
             <a:endParaRPr lang="en-US"/>
           </a:p>
@@ -536,6 +538,7 @@
           <a:p>
             <a:fld id="{5BDEB654-6116-1C4E-BDB3-646BCAC7F79C}" type="slidenum">
               <a:rPr lang="en-US" smtClean="0"/>
+              <a:pPr/>
               <a:t>‹#›</a:t>
             </a:fld>
             <a:endParaRPr lang="en-US"/>
@@ -545,7 +548,7 @@
     </p:spTree>
     <p:extLst>
       <p:ext uri="{BB962C8B-B14F-4D97-AF65-F5344CB8AC3E}">
-        <p14:creationId xmlns:p14="http://schemas.microsoft.com/office/powerpoint/2010/main" val="914072731"/>
+        <p14:creationId xmlns:p14="http://schemas.microsoft.com/office/powerpoint/2010/main" xmlns="" val="914072731"/>
       </p:ext>
     </p:extLst>
   </p:cSld>
@@ -873,6 +876,7 @@
           <a:p>
             <a:fld id="{04B9895A-707F-8341-BDFC-0D30AAC2A476}" type="slidenum">
               <a:rPr lang="en-US" smtClean="0"/>
+              <a:pPr/>
               <a:t>‹#›</a:t>
             </a:fld>
             <a:endParaRPr lang="en-US"/>
@@ -882,7 +886,7 @@
     </p:spTree>
     <p:extLst>
       <p:ext uri="{BB962C8B-B14F-4D97-AF65-F5344CB8AC3E}">
-        <p14:creationId xmlns:p14="http://schemas.microsoft.com/office/powerpoint/2010/main" val="1551167110"/>
+        <p14:creationId xmlns:p14="http://schemas.microsoft.com/office/powerpoint/2010/main" xmlns="" val="1551167110"/>
       </p:ext>
     </p:extLst>
   </p:cSld>
@@ -1057,7 +1061,7 @@
     </p:spTree>
     <p:extLst>
       <p:ext uri="{BB962C8B-B14F-4D97-AF65-F5344CB8AC3E}">
-        <p14:creationId xmlns:p14="http://schemas.microsoft.com/office/powerpoint/2010/main" val="2235976413"/>
+        <p14:creationId xmlns:p14="http://schemas.microsoft.com/office/powerpoint/2010/main" xmlns="" val="2235976413"/>
       </p:ext>
     </p:extLst>
   </p:cSld>
@@ -1242,7 +1246,7 @@
     </p:spTree>
     <p:extLst>
       <p:ext uri="{BB962C8B-B14F-4D97-AF65-F5344CB8AC3E}">
-        <p14:creationId xmlns:p14="http://schemas.microsoft.com/office/powerpoint/2010/main" val="232143751"/>
+        <p14:creationId xmlns:p14="http://schemas.microsoft.com/office/powerpoint/2010/main" xmlns="" val="232143751"/>
       </p:ext>
     </p:extLst>
   </p:cSld>
@@ -1417,7 +1421,7 @@
     </p:spTree>
     <p:extLst>
       <p:ext uri="{BB962C8B-B14F-4D97-AF65-F5344CB8AC3E}">
-        <p14:creationId xmlns:p14="http://schemas.microsoft.com/office/powerpoint/2010/main" val="3360839430"/>
+        <p14:creationId xmlns:p14="http://schemas.microsoft.com/office/powerpoint/2010/main" xmlns="" val="3360839430"/>
       </p:ext>
     </p:extLst>
   </p:cSld>
@@ -1668,7 +1672,7 @@
     </p:spTree>
     <p:extLst>
       <p:ext uri="{BB962C8B-B14F-4D97-AF65-F5344CB8AC3E}">
-        <p14:creationId xmlns:p14="http://schemas.microsoft.com/office/powerpoint/2010/main" val="1641180288"/>
+        <p14:creationId xmlns:p14="http://schemas.microsoft.com/office/powerpoint/2010/main" xmlns="" val="1641180288"/>
       </p:ext>
     </p:extLst>
   </p:cSld>
@@ -1961,7 +1965,7 @@
     </p:spTree>
     <p:extLst>
       <p:ext uri="{BB962C8B-B14F-4D97-AF65-F5344CB8AC3E}">
-        <p14:creationId xmlns:p14="http://schemas.microsoft.com/office/powerpoint/2010/main" val="2714135937"/>
+        <p14:creationId xmlns:p14="http://schemas.microsoft.com/office/powerpoint/2010/main" xmlns="" val="2714135937"/>
       </p:ext>
     </p:extLst>
   </p:cSld>
@@ -2388,7 +2392,7 @@
     </p:spTree>
     <p:extLst>
       <p:ext uri="{BB962C8B-B14F-4D97-AF65-F5344CB8AC3E}">
-        <p14:creationId xmlns:p14="http://schemas.microsoft.com/office/powerpoint/2010/main" val="2718476336"/>
+        <p14:creationId xmlns:p14="http://schemas.microsoft.com/office/powerpoint/2010/main" xmlns="" val="2718476336"/>
       </p:ext>
     </p:extLst>
   </p:cSld>
@@ -2511,7 +2515,7 @@
     </p:spTree>
     <p:extLst>
       <p:ext uri="{BB962C8B-B14F-4D97-AF65-F5344CB8AC3E}">
-        <p14:creationId xmlns:p14="http://schemas.microsoft.com/office/powerpoint/2010/main" val="32438104"/>
+        <p14:creationId xmlns:p14="http://schemas.microsoft.com/office/powerpoint/2010/main" xmlns="" val="32438104"/>
       </p:ext>
     </p:extLst>
   </p:cSld>
@@ -2611,7 +2615,7 @@
     </p:spTree>
     <p:extLst>
       <p:ext uri="{BB962C8B-B14F-4D97-AF65-F5344CB8AC3E}">
-        <p14:creationId xmlns:p14="http://schemas.microsoft.com/office/powerpoint/2010/main" val="2472508034"/>
+        <p14:creationId xmlns:p14="http://schemas.microsoft.com/office/powerpoint/2010/main" xmlns="" val="2472508034"/>
       </p:ext>
     </p:extLst>
   </p:cSld>
@@ -2883,6 +2887,7 @@
           <a:p>
             <a:fld id="{04B9895A-707F-8341-BDFC-0D30AAC2A476}" type="slidenum">
               <a:rPr lang="en-US" smtClean="0"/>
+              <a:pPr/>
               <a:t>‹#›</a:t>
             </a:fld>
             <a:endParaRPr lang="en-US"/>
@@ -2892,7 +2897,7 @@
     </p:spTree>
     <p:extLst>
       <p:ext uri="{BB962C8B-B14F-4D97-AF65-F5344CB8AC3E}">
-        <p14:creationId xmlns:p14="http://schemas.microsoft.com/office/powerpoint/2010/main" val="2435788526"/>
+        <p14:creationId xmlns:p14="http://schemas.microsoft.com/office/powerpoint/2010/main" xmlns="" val="2435788526"/>
       </p:ext>
     </p:extLst>
   </p:cSld>
@@ -3150,7 +3155,7 @@
     </p:spTree>
     <p:extLst>
       <p:ext uri="{BB962C8B-B14F-4D97-AF65-F5344CB8AC3E}">
-        <p14:creationId xmlns:p14="http://schemas.microsoft.com/office/powerpoint/2010/main" val="2527758636"/>
+        <p14:creationId xmlns:p14="http://schemas.microsoft.com/office/powerpoint/2010/main" xmlns="" val="2527758636"/>
       </p:ext>
     </p:extLst>
   </p:cSld>
@@ -3394,6 +3399,7 @@
           <a:p>
             <a:fld id="{1702091D-51C0-2749-B558-025DF5FACD90}" type="slidenum">
               <a:rPr lang="en-US" smtClean="0"/>
+              <a:pPr/>
               <a:t>‹#›</a:t>
             </a:fld>
             <a:endParaRPr lang="en-US" dirty="0" smtClean="0"/>
@@ -3403,7 +3409,7 @@
     </p:spTree>
     <p:extLst>
       <p:ext uri="{BB962C8B-B14F-4D97-AF65-F5344CB8AC3E}">
-        <p14:creationId xmlns:p14="http://schemas.microsoft.com/office/powerpoint/2010/main" val="3413567290"/>
+        <p14:creationId xmlns:p14="http://schemas.microsoft.com/office/powerpoint/2010/main" xmlns="" val="3413567290"/>
       </p:ext>
     </p:extLst>
   </p:cSld>
@@ -3755,7 +3761,6 @@
               <a:rPr lang="en-US" dirty="0" smtClean="0"/>
               <a:t>Robert Nicholson</a:t>
             </a:r>
-            <a:endParaRPr lang="en-US" dirty="0" smtClean="0"/>
           </a:p>
           <a:p>
             <a:r>
@@ -3806,6 +3811,7 @@
           <a:p>
             <a:fld id="{04B9895A-707F-8341-BDFC-0D30AAC2A476}" type="slidenum">
               <a:rPr lang="en-US" smtClean="0"/>
+              <a:pPr/>
               <a:t>1</a:t>
             </a:fld>
             <a:endParaRPr lang="en-US"/>
@@ -3843,7 +3849,7 @@
   <p:timing>
     <p:tnLst>
       <p:par>
-        <p:cTn xmlns:p14="http://schemas.microsoft.com/office/powerpoint/2010/main" id="1" dur="indefinite" restart="never" nodeType="tmRoot"/>
+        <p:cTn id="1" dur="indefinite" restart="never" nodeType="tmRoot"/>
       </p:par>
     </p:tnLst>
   </p:timing>
@@ -3877,16 +3883,23 @@
             <p:ph type="title"/>
           </p:nvPr>
         </p:nvSpPr>
-        <p:spPr/>
-        <p:txBody>
-          <a:bodyPr/>
-          <a:lstStyle/>
-          <a:p>
-            <a:r>
-              <a:rPr lang="en-US" dirty="0" smtClean="0"/>
-              <a:t>Getting Good Requirements (2)</a:t>
-            </a:r>
-            <a:endParaRPr lang="en-US" dirty="0"/>
+        <p:spPr>
+          <a:xfrm>
+            <a:off x="457200" y="274638"/>
+            <a:ext cx="8229600" cy="917494"/>
+          </a:xfrm>
+        </p:spPr>
+        <p:txBody>
+          <a:bodyPr>
+            <a:normAutofit/>
+          </a:bodyPr>
+          <a:lstStyle/>
+          <a:p>
+            <a:r>
+              <a:rPr lang="en-US" dirty="0" smtClean="0"/>
+              <a:t>Pre-Project Requirements</a:t>
+            </a:r>
+            <a:endParaRPr lang="en-US" sz="2667" dirty="0"/>
           </a:p>
         </p:txBody>
       </p:sp>
@@ -3900,18 +3913,28 @@
             <p:ph idx="1"/>
           </p:nvPr>
         </p:nvSpPr>
-        <p:spPr/>
+        <p:spPr>
+          <a:xfrm>
+            <a:off x="457200" y="1192132"/>
+            <a:ext cx="8229600" cy="4934031"/>
+          </a:xfrm>
+        </p:spPr>
         <p:txBody>
           <a:bodyPr>
-            <a:normAutofit fontScale="70000" lnSpcReduction="20000"/>
+            <a:normAutofit/>
           </a:bodyPr>
           <a:lstStyle/>
           <a:p>
             <a:r>
               <a:rPr lang="en-US" dirty="0" smtClean="0"/>
-              <a:t>Write (or re-write) Requirements</a:t>
-            </a:r>
-            <a:endParaRPr lang="en-US" dirty="0" smtClean="0"/>
+              <a:t>Need to Commit Based on Bad Requirements</a:t>
+            </a:r>
+          </a:p>
+          <a:p>
+            <a:r>
+              <a:rPr lang="en-US" dirty="0" smtClean="0"/>
+              <a:t>Minimize the Risk:</a:t>
+            </a:r>
           </a:p>
           <a:p>
             <a:pPr lvl="1">
@@ -3920,9 +3943,12 @@
             </a:pPr>
             <a:r>
               <a:rPr lang="en-US" dirty="0" smtClean="0"/>
-              <a:t>Create Use Cases</a:t>
-            </a:r>
-            <a:endParaRPr lang="en-US" dirty="0"/>
+              <a:t>Make a </a:t>
+            </a:r>
+            <a:r>
+              <a:rPr lang="en-US" i="1" dirty="0" smtClean="0"/>
+              <a:t>Conditional Commitment</a:t>
+            </a:r>
           </a:p>
           <a:p>
             <a:pPr lvl="1">
@@ -3931,29 +3957,17 @@
             </a:pPr>
             <a:r>
               <a:rPr lang="en-US" dirty="0" smtClean="0"/>
-              <a:t>Validate with Users </a:t>
-            </a:r>
-            <a:r>
-              <a:rPr lang="en-US" i="1" dirty="0" smtClean="0"/>
-              <a:t>and</a:t>
-            </a:r>
-            <a:r>
-              <a:rPr lang="en-US" dirty="0" smtClean="0"/>
-              <a:t> Decision Makers</a:t>
-            </a:r>
-          </a:p>
-          <a:p>
-            <a:r>
-              <a:rPr lang="en-US" dirty="0" smtClean="0"/>
-              <a:t>Build prototype (wireframe tools, prototyping </a:t>
-            </a:r>
-            <a:r>
-              <a:rPr lang="en-US" dirty="0"/>
-              <a:t>tools, </a:t>
-            </a:r>
-            <a:r>
-              <a:rPr lang="en-US" dirty="0" smtClean="0"/>
-              <a:t>RAD tools, web) and validate</a:t>
+              <a:t>Specify Requirements Gathering Phase</a:t>
+            </a:r>
+          </a:p>
+          <a:p>
+            <a:pPr lvl="2">
+              <a:buFont typeface="Courier New"/>
+              <a:buChar char="o"/>
+            </a:pPr>
+            <a:r>
+              <a:rPr lang="en-US" dirty="0" smtClean="0"/>
+              <a:t>Require access to users and systems</a:t>
             </a:r>
           </a:p>
           <a:p>
@@ -3963,34 +3977,20 @@
             </a:pPr>
             <a:r>
               <a:rPr lang="en-US" dirty="0" smtClean="0"/>
-              <a:t>May require multiple iterations</a:t>
-            </a:r>
-          </a:p>
-          <a:p>
-            <a:r>
-              <a:rPr lang="en-US" dirty="0" smtClean="0"/>
-              <a:t>Actual User Testing, A/B Testing</a:t>
-            </a:r>
-          </a:p>
-          <a:p>
-            <a:r>
-              <a:rPr lang="en-US" dirty="0" smtClean="0"/>
-              <a:t>Plan for </a:t>
-            </a:r>
-            <a:r>
-              <a:rPr lang="en-US" dirty="0" smtClean="0"/>
-              <a:t>Documentation</a:t>
-            </a:r>
-            <a:r>
-              <a:rPr lang="en-US" dirty="0" smtClean="0"/>
-              <a:t>, Help, Messages and Training</a:t>
-            </a:r>
-            <a:endParaRPr lang="en-US" dirty="0"/>
-          </a:p>
-          <a:p>
-            <a:r>
-              <a:rPr lang="en-US" dirty="0" smtClean="0"/>
-              <a:t>UI Transition Plan</a:t>
+              <a:t>Allow Time and Budget for Changes</a:t>
+            </a:r>
+          </a:p>
+          <a:p>
+            <a:r>
+              <a:rPr lang="en-US" dirty="0" smtClean="0"/>
+              <a:t>May Cost You Jobs!  </a:t>
+            </a:r>
+            <a:br>
+              <a:rPr lang="en-US" dirty="0" smtClean="0"/>
+            </a:br>
+            <a:r>
+              <a:rPr lang="en-US" dirty="0" smtClean="0"/>
+              <a:t>(But may get you better jobs)</a:t>
             </a:r>
           </a:p>
           <a:p>
@@ -4000,41 +4000,8 @@
             </a:pPr>
             <a:r>
               <a:rPr lang="en-US" dirty="0" smtClean="0"/>
-              <a:t>Leverage Legacy Learning</a:t>
-            </a:r>
-          </a:p>
-          <a:p>
-            <a:pPr lvl="1">
-              <a:buFont typeface="Courier New"/>
-              <a:buChar char="o"/>
-            </a:pPr>
-            <a:r>
-              <a:rPr lang="en-US" dirty="0" smtClean="0"/>
-              <a:t>Some Users Will Resist Change</a:t>
-            </a:r>
-          </a:p>
-          <a:p>
-            <a:pPr lvl="1">
-              <a:buFont typeface="Courier New"/>
-              <a:buChar char="o"/>
-            </a:pPr>
-            <a:r>
-              <a:rPr lang="en-US" dirty="0" smtClean="0"/>
-              <a:t>Incremental Change Sucks!</a:t>
-            </a:r>
-          </a:p>
-          <a:p>
-            <a:r>
-              <a:rPr lang="en-US" dirty="0" smtClean="0"/>
-              <a:t>Bottom Line:  </a:t>
-            </a:r>
-            <a:r>
-              <a:rPr lang="en-US" i="1" dirty="0" smtClean="0"/>
-              <a:t>Redevelop the Requirements</a:t>
-            </a:r>
-          </a:p>
-          <a:p>
-            <a:endParaRPr lang="en-US" dirty="0"/>
+              <a:t>Filter out problem clients</a:t>
+            </a:r>
           </a:p>
         </p:txBody>
       </p:sp>
@@ -4143,23 +4110,16 @@
             <p:ph type="title"/>
           </p:nvPr>
         </p:nvSpPr>
-        <p:spPr>
-          <a:xfrm>
-            <a:off x="457200" y="274638"/>
-            <a:ext cx="8229600" cy="917494"/>
-          </a:xfrm>
-        </p:spPr>
-        <p:txBody>
-          <a:bodyPr>
-            <a:normAutofit/>
-          </a:bodyPr>
-          <a:lstStyle/>
-          <a:p>
-            <a:r>
-              <a:rPr lang="en-US" dirty="0" smtClean="0"/>
-              <a:t>Pre-Project Requirements</a:t>
-            </a:r>
-            <a:endParaRPr lang="en-US" sz="2667" dirty="0"/>
+        <p:spPr/>
+        <p:txBody>
+          <a:bodyPr/>
+          <a:lstStyle/>
+          <a:p>
+            <a:r>
+              <a:rPr lang="en-US" dirty="0" smtClean="0"/>
+              <a:t>Getting Buy-In</a:t>
+            </a:r>
+            <a:endParaRPr lang="en-US" dirty="0"/>
           </a:p>
         </p:txBody>
       </p:sp>
@@ -4173,27 +4133,20 @@
             <p:ph idx="1"/>
           </p:nvPr>
         </p:nvSpPr>
-        <p:spPr>
-          <a:xfrm>
-            <a:off x="457200" y="1192132"/>
-            <a:ext cx="8229600" cy="4934031"/>
-          </a:xfrm>
-        </p:spPr>
-        <p:txBody>
-          <a:bodyPr>
-            <a:normAutofit/>
-          </a:bodyPr>
-          <a:lstStyle/>
-          <a:p>
-            <a:r>
-              <a:rPr lang="en-US" dirty="0" smtClean="0"/>
-              <a:t>Need to Commit Based on Bad Requirements</a:t>
-            </a:r>
-          </a:p>
-          <a:p>
-            <a:r>
-              <a:rPr lang="en-US" dirty="0" smtClean="0"/>
-              <a:t>Minimize the Risk:</a:t>
+        <p:spPr/>
+        <p:txBody>
+          <a:bodyPr/>
+          <a:lstStyle/>
+          <a:p>
+            <a:r>
+              <a:rPr lang="en-US" dirty="0" smtClean="0"/>
+              <a:t>You are asking your clients to “buy in” to investing more time and $$$ in requirements</a:t>
+            </a:r>
+          </a:p>
+          <a:p>
+            <a:r>
+              <a:rPr lang="en-US" dirty="0" smtClean="0"/>
+              <a:t>Educate your clients:</a:t>
             </a:r>
           </a:p>
           <a:p>
@@ -4203,15 +4156,7 @@
             </a:pPr>
             <a:r>
               <a:rPr lang="en-US" dirty="0" smtClean="0"/>
-              <a:t>Make a </a:t>
-            </a:r>
-            <a:r>
-              <a:rPr lang="en-US" i="1" dirty="0" smtClean="0"/>
-              <a:t>Conditional </a:t>
-            </a:r>
-            <a:r>
-              <a:rPr lang="en-US" i="1" dirty="0" smtClean="0"/>
-              <a:t>Commitment</a:t>
+              <a:t>Present UI design principles</a:t>
             </a:r>
           </a:p>
           <a:p>
@@ -4221,17 +4166,7 @@
             </a:pPr>
             <a:r>
               <a:rPr lang="en-US" dirty="0" smtClean="0"/>
-              <a:t>Specify Requirements Gathering Phase</a:t>
-            </a:r>
-          </a:p>
-          <a:p>
-            <a:pPr lvl="2">
-              <a:buFont typeface="Courier New"/>
-              <a:buChar char="o"/>
-            </a:pPr>
-            <a:r>
-              <a:rPr lang="en-US" dirty="0" smtClean="0"/>
-              <a:t>Require access to users and systems</a:t>
+              <a:t>Identify the information you need</a:t>
             </a:r>
           </a:p>
           <a:p>
@@ -4241,31 +4176,22 @@
             </a:pPr>
             <a:r>
               <a:rPr lang="en-US" dirty="0" smtClean="0"/>
-              <a:t>Allow Time and Budget for Changes</a:t>
-            </a:r>
-          </a:p>
-          <a:p>
-            <a:r>
-              <a:rPr lang="en-US" dirty="0" smtClean="0"/>
-              <a:t>May Cost You Jobs!  </a:t>
-            </a:r>
-            <a:br>
-              <a:rPr lang="en-US" dirty="0" smtClean="0"/>
-            </a:br>
-            <a:r>
-              <a:rPr lang="en-US" dirty="0" smtClean="0"/>
-              <a:t>(But may get you better jobs)</a:t>
-            </a:r>
-          </a:p>
-          <a:p>
-            <a:pPr lvl="1">
+              <a:t>Explain where the requirements fall short</a:t>
+            </a:r>
+          </a:p>
+          <a:p>
+            <a:r>
+              <a:rPr lang="en-US" dirty="0" smtClean="0"/>
+              <a:t>A well-written handout (with citations) on the process can help establish your credibility</a:t>
+            </a:r>
+            <a:endParaRPr lang="en-US" dirty="0"/>
+          </a:p>
+          <a:p>
+            <a:pPr>
               <a:buFont typeface="Courier New"/>
               <a:buChar char="o"/>
             </a:pPr>
-            <a:r>
-              <a:rPr lang="en-US" dirty="0" smtClean="0"/>
-              <a:t>Filter out problem clients</a:t>
-            </a:r>
+            <a:endParaRPr lang="en-US" dirty="0"/>
           </a:p>
         </p:txBody>
       </p:sp>
@@ -4294,7 +4220,30 @@
       </p:sp>
       <p:sp>
         <p:nvSpPr>
-          <p:cNvPr id="5" name="Slide Number Placeholder 4"/>
+          <p:cNvPr id="5" name="Footer Placeholder 4"/>
+          <p:cNvSpPr>
+            <a:spLocks noGrp="1"/>
+          </p:cNvSpPr>
+          <p:nvPr>
+            <p:ph type="ftr" sz="quarter" idx="11"/>
+          </p:nvPr>
+        </p:nvSpPr>
+        <p:spPr/>
+        <p:txBody>
+          <a:bodyPr/>
+          <a:lstStyle/>
+          <a:p>
+            <a:r>
+              <a:rPr lang="en-US" smtClean="0"/>
+              <a:t>Robert Nicholson</a:t>
+            </a:r>
+            <a:endParaRPr lang="en-US"/>
+          </a:p>
+        </p:txBody>
+      </p:sp>
+      <p:sp>
+        <p:nvSpPr>
+          <p:cNvPr id="6" name="Slide Number Placeholder 5"/>
           <p:cNvSpPr>
             <a:spLocks noGrp="1"/>
           </p:cNvSpPr>
@@ -4316,30 +4265,12 @@
           </a:p>
         </p:txBody>
       </p:sp>
-      <p:sp>
-        <p:nvSpPr>
-          <p:cNvPr id="6" name="Footer Placeholder 5"/>
-          <p:cNvSpPr>
-            <a:spLocks noGrp="1"/>
-          </p:cNvSpPr>
-          <p:nvPr>
-            <p:ph type="ftr" sz="quarter" idx="11"/>
-          </p:nvPr>
-        </p:nvSpPr>
-        <p:spPr/>
-        <p:txBody>
-          <a:bodyPr/>
-          <a:lstStyle/>
-          <a:p>
-            <a:r>
-              <a:rPr lang="en-US" smtClean="0"/>
-              <a:t>Robert Nicholson</a:t>
-            </a:r>
-            <a:endParaRPr lang="en-US"/>
-          </a:p>
-        </p:txBody>
-      </p:sp>
     </p:spTree>
+    <p:extLst>
+      <p:ext uri="{BB962C8B-B14F-4D97-AF65-F5344CB8AC3E}">
+        <p14:creationId xmlns:p14="http://schemas.microsoft.com/office/powerpoint/2010/main" xmlns="" val="1180927361"/>
+      </p:ext>
+    </p:extLst>
   </p:cSld>
   <p:clrMapOvr>
     <a:masterClrMapping/>
@@ -4381,7 +4312,7 @@
           <a:p>
             <a:r>
               <a:rPr lang="en-US" dirty="0" smtClean="0"/>
-              <a:t>Getting Buy-In</a:t>
+              <a:t>Requirements Management</a:t>
             </a:r>
             <a:endParaRPr lang="en-US" dirty="0"/>
           </a:p>
@@ -4399,18 +4330,20 @@
         </p:nvSpPr>
         <p:spPr/>
         <p:txBody>
-          <a:bodyPr/>
-          <a:lstStyle/>
-          <a:p>
-            <a:r>
-              <a:rPr lang="en-US" dirty="0" smtClean="0"/>
-              <a:t>You are asking your clients to “buy in” to investing more time and $$$ in requirements</a:t>
-            </a:r>
-          </a:p>
-          <a:p>
-            <a:r>
-              <a:rPr lang="en-US" dirty="0" smtClean="0"/>
-              <a:t>Educate your clients:</a:t>
+          <a:bodyPr>
+            <a:normAutofit fontScale="77500" lnSpcReduction="20000"/>
+          </a:bodyPr>
+          <a:lstStyle/>
+          <a:p>
+            <a:r>
+              <a:rPr lang="en-US" dirty="0" smtClean="0"/>
+              <a:t>Requirements evolve in the course of the project</a:t>
+            </a:r>
+          </a:p>
+          <a:p>
+            <a:r>
+              <a:rPr lang="en-US" dirty="0" smtClean="0"/>
+              <a:t>Need to control and limit the changes</a:t>
             </a:r>
           </a:p>
           <a:p>
@@ -4420,7 +4353,21 @@
             </a:pPr>
             <a:r>
               <a:rPr lang="en-US" dirty="0" smtClean="0"/>
-              <a:t>Present UI design principles</a:t>
+              <a:t>Requires People Management / Project Management</a:t>
+            </a:r>
+          </a:p>
+          <a:p>
+            <a:r>
+              <a:rPr lang="en-US" dirty="0" smtClean="0"/>
+              <a:t>Insist on a Single </a:t>
+            </a:r>
+            <a:r>
+              <a:rPr lang="en-US" u="sng" dirty="0" smtClean="0"/>
+              <a:t>Authoritative</a:t>
+            </a:r>
+            <a:r>
+              <a:rPr lang="en-US" dirty="0" smtClean="0"/>
+              <a:t> Contact</a:t>
             </a:r>
           </a:p>
           <a:p>
@@ -4430,8 +4377,9 @@
             </a:pPr>
             <a:r>
               <a:rPr lang="en-US" dirty="0" smtClean="0"/>
-              <a:t>Identify the information you need</a:t>
-            </a:r>
+              <a:t>Assemble input from multiple people</a:t>
+            </a:r>
+            <a:endParaRPr lang="en-US" dirty="0"/>
           </a:p>
           <a:p>
             <a:pPr lvl="1">
@@ -4440,21 +4388,73 @@
             </a:pPr>
             <a:r>
               <a:rPr lang="en-US" dirty="0" smtClean="0"/>
-              <a:t>Explain where the requirements fall short</a:t>
-            </a:r>
-          </a:p>
-          <a:p>
-            <a:r>
-              <a:rPr lang="en-US" dirty="0" smtClean="0"/>
-              <a:t>A well-written handout (with citations) on the process can help establish your credibility</a:t>
-            </a:r>
-            <a:endParaRPr lang="en-US" dirty="0"/>
-          </a:p>
-          <a:p>
-            <a:pPr>
+              <a:t>May not be decision maker, but must have </a:t>
+            </a:r>
+            <a:br>
+              <a:rPr lang="en-US" dirty="0" smtClean="0"/>
+            </a:br>
+            <a:r>
+              <a:rPr lang="en-US" i="1" dirty="0" smtClean="0"/>
+              <a:t>direct access to decision maker</a:t>
+            </a:r>
+          </a:p>
+          <a:p>
+            <a:pPr lvl="1">
               <a:buFont typeface="Courier New"/>
               <a:buChar char="o"/>
             </a:pPr>
+            <a:r>
+              <a:rPr lang="en-US" dirty="0" smtClean="0"/>
+              <a:t>You still need </a:t>
+            </a:r>
+            <a:r>
+              <a:rPr lang="en-US" i="1" dirty="0" smtClean="0"/>
+              <a:t>access</a:t>
+            </a:r>
+            <a:r>
+              <a:rPr lang="en-US" dirty="0" smtClean="0"/>
+              <a:t> to actual users</a:t>
+            </a:r>
+          </a:p>
+          <a:p>
+            <a:r>
+              <a:rPr lang="en-US" u="sng" dirty="0" smtClean="0"/>
+              <a:t>Put</a:t>
+            </a:r>
+            <a:r>
+              <a:rPr lang="en-US" dirty="0" smtClean="0"/>
+              <a:t> Everything in Writing</a:t>
+            </a:r>
+          </a:p>
+          <a:p>
+            <a:pPr lvl="1">
+              <a:buFont typeface="Courier New"/>
+              <a:buChar char="o"/>
+            </a:pPr>
+            <a:r>
+              <a:rPr lang="en-US" dirty="0" smtClean="0"/>
+              <a:t>Meeting minutes</a:t>
+            </a:r>
+          </a:p>
+          <a:p>
+            <a:r>
+              <a:rPr lang="en-US" u="sng" dirty="0" smtClean="0"/>
+              <a:t>Get</a:t>
+            </a:r>
+            <a:r>
+              <a:rPr lang="en-US" dirty="0" smtClean="0"/>
+              <a:t> Everything </a:t>
+            </a:r>
+            <a:r>
+              <a:rPr lang="en-US" dirty="0"/>
+              <a:t>in Writing (including approvals)</a:t>
+            </a:r>
+          </a:p>
+          <a:p>
+            <a:r>
+              <a:rPr lang="en-US" dirty="0" smtClean="0"/>
+              <a:t>Timetable for Requirements Review by Client</a:t>
+            </a:r>
             <a:endParaRPr lang="en-US" dirty="0"/>
           </a:p>
         </p:txBody>
@@ -4484,30 +4484,7 @@
       </p:sp>
       <p:sp>
         <p:nvSpPr>
-          <p:cNvPr id="5" name="Footer Placeholder 4"/>
-          <p:cNvSpPr>
-            <a:spLocks noGrp="1"/>
-          </p:cNvSpPr>
-          <p:nvPr>
-            <p:ph type="ftr" sz="quarter" idx="11"/>
-          </p:nvPr>
-        </p:nvSpPr>
-        <p:spPr/>
-        <p:txBody>
-          <a:bodyPr/>
-          <a:lstStyle/>
-          <a:p>
-            <a:r>
-              <a:rPr lang="en-US" smtClean="0"/>
-              <a:t>Robert Nicholson</a:t>
-            </a:r>
-            <a:endParaRPr lang="en-US"/>
-          </a:p>
-        </p:txBody>
-      </p:sp>
-      <p:sp>
-        <p:nvSpPr>
-          <p:cNvPr id="6" name="Slide Number Placeholder 5"/>
+          <p:cNvPr id="5" name="Slide Number Placeholder 4"/>
           <p:cNvSpPr>
             <a:spLocks noGrp="1"/>
           </p:cNvSpPr>
@@ -4529,12 +4506,30 @@
           </a:p>
         </p:txBody>
       </p:sp>
+      <p:sp>
+        <p:nvSpPr>
+          <p:cNvPr id="6" name="Footer Placeholder 5"/>
+          <p:cNvSpPr>
+            <a:spLocks noGrp="1"/>
+          </p:cNvSpPr>
+          <p:nvPr>
+            <p:ph type="ftr" sz="quarter" idx="11"/>
+          </p:nvPr>
+        </p:nvSpPr>
+        <p:spPr/>
+        <p:txBody>
+          <a:bodyPr/>
+          <a:lstStyle/>
+          <a:p>
+            <a:r>
+              <a:rPr lang="en-US" smtClean="0"/>
+              <a:t>Robert Nicholson</a:t>
+            </a:r>
+            <a:endParaRPr lang="en-US"/>
+          </a:p>
+        </p:txBody>
+      </p:sp>
     </p:spTree>
-    <p:extLst>
-      <p:ext uri="{BB962C8B-B14F-4D97-AF65-F5344CB8AC3E}">
-        <p14:creationId xmlns:p14="http://schemas.microsoft.com/office/powerpoint/2010/main" val="1180927361"/>
-      </p:ext>
-    </p:extLst>
   </p:cSld>
   <p:clrMapOvr>
     <a:masterClrMapping/>
@@ -4576,7 +4571,7 @@
           <a:p>
             <a:r>
               <a:rPr lang="en-US" dirty="0" smtClean="0"/>
-              <a:t>Requirements Management</a:t>
+              <a:t>Summary</a:t>
             </a:r>
             <a:endParaRPr lang="en-US" dirty="0"/>
           </a:p>
@@ -4592,7 +4587,12 @@
             <p:ph idx="1"/>
           </p:nvPr>
         </p:nvSpPr>
-        <p:spPr/>
+        <p:spPr>
+          <a:xfrm>
+            <a:off x="457200" y="1417638"/>
+            <a:ext cx="8229600" cy="4708525"/>
+          </a:xfrm>
+        </p:spPr>
         <p:txBody>
           <a:bodyPr>
             <a:normAutofit fontScale="77500" lnSpcReduction="20000"/>
@@ -4601,17 +4601,25 @@
           <a:p>
             <a:r>
               <a:rPr lang="en-US" dirty="0" smtClean="0"/>
-              <a:t>Requirements evolve in the course of the project</a:t>
-            </a:r>
-          </a:p>
-          <a:p>
-            <a:r>
-              <a:rPr lang="en-US" dirty="0" smtClean="0"/>
-              <a:t>Need to control and </a:t>
-            </a:r>
-            <a:r>
-              <a:rPr lang="en-US" dirty="0" smtClean="0"/>
-              <a:t>limit the changes</a:t>
+              <a:t>Take Charge of Requirements</a:t>
+            </a:r>
+          </a:p>
+          <a:p>
+            <a:r>
+              <a:rPr lang="en-US" dirty="0"/>
+              <a:t>Have a </a:t>
+            </a:r>
+            <a:r>
+              <a:rPr lang="en-US" i="1" dirty="0"/>
+              <a:t>Plan</a:t>
+            </a:r>
+            <a:r>
+              <a:rPr lang="en-US" dirty="0"/>
+              <a:t> for </a:t>
+            </a:r>
+            <a:r>
+              <a:rPr lang="en-US" dirty="0" smtClean="0"/>
+              <a:t>Requirements</a:t>
             </a:r>
           </a:p>
           <a:p>
@@ -4621,25 +4629,15 @@
             </a:pPr>
             <a:r>
               <a:rPr lang="en-US" dirty="0" smtClean="0"/>
-              <a:t>Requires People </a:t>
-            </a:r>
-            <a:r>
-              <a:rPr lang="en-US" dirty="0" smtClean="0"/>
-              <a:t>Management / Project Management</a:t>
-            </a:r>
-          </a:p>
-          <a:p>
-            <a:r>
-              <a:rPr lang="en-US" dirty="0" smtClean="0"/>
-              <a:t>Insist on a Single </a:t>
-            </a:r>
-            <a:r>
-              <a:rPr lang="en-US" u="sng" dirty="0" smtClean="0"/>
-              <a:t>Authoritative</a:t>
-            </a:r>
-            <a:r>
-              <a:rPr lang="en-US" dirty="0" smtClean="0"/>
-              <a:t> Contact</a:t>
+              <a:t>Determine </a:t>
+            </a:r>
+            <a:r>
+              <a:rPr lang="en-US" dirty="0"/>
+              <a:t>business </a:t>
+            </a:r>
+            <a:r>
+              <a:rPr lang="en-US" dirty="0" smtClean="0"/>
+              <a:t>priorities</a:t>
             </a:r>
           </a:p>
           <a:p>
@@ -4649,9 +4647,16 @@
             </a:pPr>
             <a:r>
               <a:rPr lang="en-US" dirty="0" smtClean="0"/>
-              <a:t>Assemble input from multiple people</a:t>
-            </a:r>
-            <a:endParaRPr lang="en-US" dirty="0"/>
+              <a:t>Survey </a:t>
+            </a:r>
+            <a:r>
+              <a:rPr lang="en-US" dirty="0"/>
+              <a:t>basic </a:t>
+            </a:r>
+            <a:r>
+              <a:rPr lang="en-US" dirty="0" smtClean="0"/>
+              <a:t>requirements</a:t>
+            </a:r>
           </a:p>
           <a:p>
             <a:pPr lvl="1">
@@ -4660,14 +4665,7 @@
             </a:pPr>
             <a:r>
               <a:rPr lang="en-US" dirty="0" smtClean="0"/>
-              <a:t>May not be decision maker, but must have </a:t>
-            </a:r>
-            <a:br>
-              <a:rPr lang="en-US" dirty="0" smtClean="0"/>
-            </a:br>
-            <a:r>
-              <a:rPr lang="en-US" i="1" dirty="0" smtClean="0"/>
-              <a:t>direct access to decision maker</a:t>
+              <a:t>Review documentation</a:t>
             </a:r>
           </a:p>
           <a:p>
@@ -4677,25 +4675,7 @@
             </a:pPr>
             <a:r>
               <a:rPr lang="en-US" dirty="0" smtClean="0"/>
-              <a:t>You still need </a:t>
-            </a:r>
-            <a:r>
-              <a:rPr lang="en-US" i="1" dirty="0" smtClean="0"/>
-              <a:t>access</a:t>
-            </a:r>
-            <a:r>
-              <a:rPr lang="en-US" dirty="0" smtClean="0"/>
-              <a:t> to actual users</a:t>
-            </a:r>
-          </a:p>
-          <a:p>
-            <a:r>
-              <a:rPr lang="en-US" u="sng" dirty="0" smtClean="0"/>
-              <a:t>Put</a:t>
-            </a:r>
-            <a:r>
-              <a:rPr lang="en-US" dirty="0" smtClean="0"/>
-              <a:t> Everything in Writing</a:t>
+              <a:t>engage users</a:t>
             </a:r>
           </a:p>
           <a:p>
@@ -4705,35 +4685,65 @@
             </a:pPr>
             <a:r>
               <a:rPr lang="en-US" dirty="0" smtClean="0"/>
-              <a:t>Meeting minutes</a:t>
-            </a:r>
-          </a:p>
-          <a:p>
-            <a:r>
-              <a:rPr lang="en-US" u="sng" dirty="0" smtClean="0"/>
-              <a:t>Get</a:t>
-            </a:r>
-            <a:r>
-              <a:rPr lang="en-US" dirty="0" smtClean="0"/>
-              <a:t> Everything </a:t>
+              <a:t>view </a:t>
             </a:r>
             <a:r>
               <a:rPr lang="en-US" dirty="0"/>
-              <a:t>in Writing (including approvals)</a:t>
-            </a:r>
-          </a:p>
-          <a:p>
-            <a:r>
-              <a:rPr lang="en-US" dirty="0" smtClean="0"/>
-              <a:t>Timetable for Requirements Review by Client</a:t>
+              <a:t>end-to-end </a:t>
+            </a:r>
+            <a:r>
+              <a:rPr lang="en-US" dirty="0" smtClean="0"/>
+              <a:t>system</a:t>
+            </a:r>
+          </a:p>
+          <a:p>
+            <a:pPr lvl="1">
+              <a:buFont typeface="Courier New"/>
+              <a:buChar char="o"/>
+            </a:pPr>
+            <a:r>
+              <a:rPr lang="en-US" dirty="0" smtClean="0"/>
+              <a:t>incorporate </a:t>
+            </a:r>
+            <a:r>
+              <a:rPr lang="en-US" dirty="0"/>
+              <a:t>knowledge of IU/UX technology &amp; best </a:t>
+            </a:r>
+            <a:r>
+              <a:rPr lang="en-US" dirty="0" smtClean="0"/>
+              <a:t>practices</a:t>
             </a:r>
             <a:endParaRPr lang="en-US" dirty="0"/>
           </a:p>
-        </p:txBody>
-      </p:sp>
-      <p:sp>
-        <p:nvSpPr>
-          <p:cNvPr id="4" name="Date Placeholder 3"/>
+          <a:p>
+            <a:r>
+              <a:rPr lang="en-US" i="1" dirty="0" smtClean="0"/>
+              <a:t>Inform Client of Need for Interface Review &amp; Update</a:t>
+            </a:r>
+          </a:p>
+          <a:p>
+            <a:r>
+              <a:rPr lang="en-US" dirty="0" smtClean="0"/>
+              <a:t>Schedule and Budget for mid-project Interface Review(s)</a:t>
+            </a:r>
+          </a:p>
+          <a:p>
+            <a:r>
+              <a:rPr lang="en-US" dirty="0" smtClean="0"/>
+              <a:t>Plan for Documentation and Training</a:t>
+            </a:r>
+          </a:p>
+          <a:p>
+            <a:r>
+              <a:rPr lang="en-US" dirty="0" smtClean="0"/>
+              <a:t>Plan for Interface Transition / Rollout</a:t>
+            </a:r>
+          </a:p>
+        </p:txBody>
+      </p:sp>
+      <p:sp>
+        <p:nvSpPr>
+          <p:cNvPr id="5" name="Date Placeholder 4"/>
           <p:cNvSpPr>
             <a:spLocks noGrp="1"/>
           </p:cNvSpPr>
@@ -4756,7 +4766,7 @@
       </p:sp>
       <p:sp>
         <p:nvSpPr>
-          <p:cNvPr id="5" name="Slide Number Placeholder 4"/>
+          <p:cNvPr id="6" name="Slide Number Placeholder 5"/>
           <p:cNvSpPr>
             <a:spLocks noGrp="1"/>
           </p:cNvSpPr>
@@ -4780,7 +4790,7 @@
       </p:sp>
       <p:sp>
         <p:nvSpPr>
-          <p:cNvPr id="6" name="Footer Placeholder 5"/>
+          <p:cNvPr id="4" name="Footer Placeholder 3"/>
           <p:cNvSpPr>
             <a:spLocks noGrp="1"/>
           </p:cNvSpPr>
@@ -4802,6 +4812,11 @@
         </p:txBody>
       </p:sp>
     </p:spTree>
+    <p:extLst>
+      <p:ext uri="{BB962C8B-B14F-4D97-AF65-F5344CB8AC3E}">
+        <p14:creationId xmlns:p14="http://schemas.microsoft.com/office/powerpoint/2010/main" xmlns="" val="3497853338"/>
+      </p:ext>
+    </p:extLst>
   </p:cSld>
   <p:clrMapOvr>
     <a:masterClrMapping/>
@@ -4833,234 +4848,98 @@
             <a:spLocks noGrp="1"/>
           </p:cNvSpPr>
           <p:nvPr>
-            <p:ph type="title"/>
-          </p:nvPr>
-        </p:nvSpPr>
-        <p:spPr/>
-        <p:txBody>
-          <a:bodyPr/>
-          <a:lstStyle/>
-          <a:p>
-            <a:r>
-              <a:rPr lang="en-US" dirty="0" smtClean="0"/>
-              <a:t>Summary</a:t>
-            </a:r>
-            <a:endParaRPr lang="en-US" dirty="0"/>
-          </a:p>
-        </p:txBody>
-      </p:sp>
-      <p:sp>
-        <p:nvSpPr>
-          <p:cNvPr id="3" name="Content Placeholder 2"/>
-          <p:cNvSpPr>
-            <a:spLocks noGrp="1"/>
-          </p:cNvSpPr>
-          <p:nvPr>
-            <p:ph idx="1"/>
+            <p:ph type="ctrTitle"/>
           </p:nvPr>
         </p:nvSpPr>
         <p:spPr>
           <a:xfrm>
-            <a:off x="457200" y="1417638"/>
-            <a:ext cx="8229600" cy="4708525"/>
+            <a:off x="685800" y="1357005"/>
+            <a:ext cx="7772400" cy="1932067"/>
           </a:xfrm>
         </p:spPr>
         <p:txBody>
           <a:bodyPr>
-            <a:normAutofit fontScale="77500" lnSpcReduction="20000"/>
+            <a:normAutofit fontScale="90000"/>
           </a:bodyPr>
           <a:lstStyle/>
           <a:p>
             <a:r>
               <a:rPr lang="en-US" dirty="0" smtClean="0"/>
-              <a:t>Take Charge of Requirements</a:t>
-            </a:r>
-          </a:p>
-          <a:p>
-            <a:r>
-              <a:rPr lang="en-US" dirty="0"/>
-              <a:t>Have a </a:t>
-            </a:r>
-            <a:r>
-              <a:rPr lang="en-US" i="1" dirty="0"/>
-              <a:t>Plan</a:t>
-            </a:r>
-            <a:r>
-              <a:rPr lang="en-US" dirty="0"/>
-              <a:t> for </a:t>
-            </a:r>
-            <a:r>
-              <a:rPr lang="en-US" dirty="0" smtClean="0"/>
-              <a:t>Requirements</a:t>
-            </a:r>
-          </a:p>
-          <a:p>
-            <a:pPr lvl="1">
-              <a:buFont typeface="Courier New"/>
-              <a:buChar char="o"/>
-            </a:pPr>
-            <a:r>
-              <a:rPr lang="en-US" dirty="0" smtClean="0"/>
-              <a:t>Determine </a:t>
-            </a:r>
-            <a:r>
-              <a:rPr lang="en-US" dirty="0"/>
-              <a:t>business </a:t>
-            </a:r>
-            <a:r>
-              <a:rPr lang="en-US" dirty="0" smtClean="0"/>
-              <a:t>priorities</a:t>
-            </a:r>
-          </a:p>
-          <a:p>
-            <a:pPr lvl="1">
-              <a:buFont typeface="Courier New"/>
-              <a:buChar char="o"/>
-            </a:pPr>
-            <a:r>
-              <a:rPr lang="en-US" dirty="0" smtClean="0"/>
-              <a:t>Survey </a:t>
-            </a:r>
-            <a:r>
-              <a:rPr lang="en-US" dirty="0"/>
-              <a:t>basic </a:t>
-            </a:r>
-            <a:r>
-              <a:rPr lang="en-US" dirty="0" smtClean="0"/>
-              <a:t>requirements</a:t>
-            </a:r>
-          </a:p>
-          <a:p>
-            <a:pPr lvl="1">
-              <a:buFont typeface="Courier New"/>
-              <a:buChar char="o"/>
-            </a:pPr>
-            <a:r>
-              <a:rPr lang="en-US" dirty="0" smtClean="0"/>
-              <a:t>Review documentation</a:t>
-            </a:r>
-          </a:p>
-          <a:p>
-            <a:pPr lvl="1">
-              <a:buFont typeface="Courier New"/>
-              <a:buChar char="o"/>
-            </a:pPr>
-            <a:r>
-              <a:rPr lang="en-US" dirty="0" smtClean="0"/>
-              <a:t>engage users</a:t>
-            </a:r>
-          </a:p>
-          <a:p>
-            <a:pPr lvl="1">
-              <a:buFont typeface="Courier New"/>
-              <a:buChar char="o"/>
-            </a:pPr>
-            <a:r>
-              <a:rPr lang="en-US" dirty="0" smtClean="0"/>
-              <a:t>view </a:t>
-            </a:r>
-            <a:r>
-              <a:rPr lang="en-US" dirty="0"/>
-              <a:t>end-to-end </a:t>
-            </a:r>
-            <a:r>
-              <a:rPr lang="en-US" dirty="0" smtClean="0"/>
-              <a:t>system</a:t>
-            </a:r>
-          </a:p>
-          <a:p>
-            <a:pPr lvl="1">
-              <a:buFont typeface="Courier New"/>
-              <a:buChar char="o"/>
-            </a:pPr>
-            <a:r>
-              <a:rPr lang="en-US" dirty="0" smtClean="0"/>
-              <a:t>incorporate </a:t>
-            </a:r>
-            <a:r>
-              <a:rPr lang="en-US" dirty="0"/>
-              <a:t>knowledge of IU/UX technology &amp; best </a:t>
-            </a:r>
-            <a:r>
-              <a:rPr lang="en-US" dirty="0" smtClean="0"/>
-              <a:t>practices</a:t>
+              <a:t>Working with Graphic</a:t>
+            </a:r>
+            <a:br>
+              <a:rPr lang="en-US" dirty="0" smtClean="0"/>
+            </a:br>
+            <a:r>
+              <a:rPr lang="en-US" dirty="0" smtClean="0"/>
+              <a:t>Designers</a:t>
+            </a:r>
+            <a:br>
+              <a:rPr lang="en-US" dirty="0" smtClean="0"/>
+            </a:br>
+            <a:r>
+              <a:rPr lang="en-US" sz="3600" i="1" dirty="0" smtClean="0"/>
+              <a:t>Experiences and Lessons Learned</a:t>
+            </a:r>
+            <a:endParaRPr lang="en-US" sz="3600" i="1" dirty="0"/>
+          </a:p>
+        </p:txBody>
+      </p:sp>
+      <p:sp>
+        <p:nvSpPr>
+          <p:cNvPr id="3" name="Subtitle 2"/>
+          <p:cNvSpPr>
+            <a:spLocks noGrp="1"/>
+          </p:cNvSpPr>
+          <p:nvPr>
+            <p:ph type="subTitle" idx="1"/>
+          </p:nvPr>
+        </p:nvSpPr>
+        <p:spPr/>
+        <p:txBody>
+          <a:bodyPr/>
+          <a:lstStyle/>
+          <a:p>
+            <a:r>
+              <a:rPr lang="en-US" dirty="0" smtClean="0"/>
+              <a:t>Robert Nicholson</a:t>
+            </a:r>
+          </a:p>
+          <a:p>
+            <a:r>
+              <a:rPr lang="en-US" sz="2000" dirty="0" err="1" smtClean="0"/>
+              <a:t>bob-n@wygk.com</a:t>
+            </a:r>
+            <a:endParaRPr lang="en-US" sz="2000" dirty="0"/>
+          </a:p>
+        </p:txBody>
+      </p:sp>
+      <p:sp>
+        <p:nvSpPr>
+          <p:cNvPr id="4" name="Date Placeholder 3"/>
+          <p:cNvSpPr>
+            <a:spLocks noGrp="1"/>
+          </p:cNvSpPr>
+          <p:nvPr>
+            <p:ph type="dt" sz="half" idx="10"/>
+          </p:nvPr>
+        </p:nvSpPr>
+        <p:spPr/>
+        <p:txBody>
+          <a:bodyPr/>
+          <a:lstStyle/>
+          <a:p>
+            <a:r>
+              <a:rPr lang="en-US" smtClean="0"/>
+              <a:t>2/10/15</a:t>
             </a:r>
             <a:endParaRPr lang="en-US" dirty="0"/>
           </a:p>
-          <a:p>
-            <a:r>
-              <a:rPr lang="en-US" i="1" dirty="0" smtClean="0"/>
-              <a:t>Inform Client of Need for </a:t>
-            </a:r>
-            <a:r>
-              <a:rPr lang="en-US" i="1" dirty="0" smtClean="0"/>
-              <a:t>Interface Review </a:t>
-            </a:r>
-            <a:r>
-              <a:rPr lang="en-US" i="1" dirty="0" smtClean="0"/>
-              <a:t>&amp; </a:t>
-            </a:r>
-            <a:r>
-              <a:rPr lang="en-US" i="1" dirty="0" smtClean="0"/>
-              <a:t>Update</a:t>
-            </a:r>
-            <a:endParaRPr lang="en-US" i="1" dirty="0" smtClean="0"/>
-          </a:p>
-          <a:p>
-            <a:r>
-              <a:rPr lang="en-US" dirty="0" smtClean="0"/>
-              <a:t>Schedule and Budget for </a:t>
-            </a:r>
-            <a:r>
-              <a:rPr lang="en-US" dirty="0" smtClean="0"/>
-              <a:t>mid-project Interface Review(s)</a:t>
-            </a:r>
-            <a:endParaRPr lang="en-US" dirty="0" smtClean="0"/>
-          </a:p>
-          <a:p>
-            <a:r>
-              <a:rPr lang="en-US" dirty="0" smtClean="0"/>
-              <a:t>Plan </a:t>
-            </a:r>
-            <a:r>
-              <a:rPr lang="en-US" dirty="0" smtClean="0"/>
-              <a:t>for Documentation and Training</a:t>
-            </a:r>
-          </a:p>
-          <a:p>
-            <a:r>
-              <a:rPr lang="en-US" dirty="0" smtClean="0"/>
-              <a:t>Plan for Interface Transition / Rollout</a:t>
-            </a:r>
-          </a:p>
-        </p:txBody>
-      </p:sp>
-      <p:sp>
-        <p:nvSpPr>
-          <p:cNvPr id="5" name="Date Placeholder 4"/>
-          <p:cNvSpPr>
-            <a:spLocks noGrp="1"/>
-          </p:cNvSpPr>
-          <p:nvPr>
-            <p:ph type="dt" sz="half" idx="10"/>
-          </p:nvPr>
-        </p:nvSpPr>
-        <p:spPr/>
-        <p:txBody>
-          <a:bodyPr/>
-          <a:lstStyle/>
-          <a:p>
-            <a:r>
-              <a:rPr lang="en-US" smtClean="0"/>
-              <a:t>2/10/15</a:t>
-            </a:r>
-            <a:endParaRPr lang="en-US"/>
-          </a:p>
-        </p:txBody>
-      </p:sp>
-      <p:sp>
-        <p:nvSpPr>
-          <p:cNvPr id="6" name="Slide Number Placeholder 5"/>
+        </p:txBody>
+      </p:sp>
+      <p:sp>
+        <p:nvSpPr>
+          <p:cNvPr id="5" name="Slide Number Placeholder 4"/>
           <p:cNvSpPr>
             <a:spLocks noGrp="1"/>
           </p:cNvSpPr>
@@ -5073,7 +4952,7 @@
           <a:bodyPr/>
           <a:lstStyle/>
           <a:p>
-            <a:fld id="{8A0A27A7-74DC-2A47-9D23-749C6EF32631}" type="slidenum">
+            <a:fld id="{04B9895A-707F-8341-BDFC-0D30AAC2A476}" type="slidenum">
               <a:rPr lang="en-US" smtClean="0"/>
               <a:pPr/>
               <a:t>14</a:t>
@@ -5084,7 +4963,7 @@
       </p:sp>
       <p:sp>
         <p:nvSpPr>
-          <p:cNvPr id="4" name="Footer Placeholder 3"/>
+          <p:cNvPr id="6" name="Footer Placeholder 5"/>
           <p:cNvSpPr>
             <a:spLocks noGrp="1"/>
           </p:cNvSpPr>
@@ -5108,13 +4987,20 @@
     </p:spTree>
     <p:extLst>
       <p:ext uri="{BB962C8B-B14F-4D97-AF65-F5344CB8AC3E}">
-        <p14:creationId xmlns:p14="http://schemas.microsoft.com/office/powerpoint/2010/main" val="3497853338"/>
+        <p14:creationId xmlns:p14="http://schemas.microsoft.com/office/powerpoint/2010/main" xmlns="" val="3500118801"/>
       </p:ext>
     </p:extLst>
   </p:cSld>
   <p:clrMapOvr>
     <a:masterClrMapping/>
   </p:clrMapOvr>
+  <p:timing>
+    <p:tnLst>
+      <p:par>
+        <p:cTn id="1" dur="indefinite" restart="never" nodeType="tmRoot"/>
+      </p:par>
+    </p:tnLst>
+  </p:timing>
 </p:sld>
 </file>
 
@@ -5142,76 +5028,109 @@
             <a:spLocks noGrp="1"/>
           </p:cNvSpPr>
           <p:nvPr>
-            <p:ph type="ctrTitle"/>
+            <p:ph type="title"/>
+          </p:nvPr>
+        </p:nvSpPr>
+        <p:spPr/>
+        <p:txBody>
+          <a:bodyPr/>
+          <a:lstStyle/>
+          <a:p>
+            <a:r>
+              <a:rPr lang="en-US" dirty="0" smtClean="0"/>
+              <a:t>Design is Important</a:t>
+            </a:r>
+            <a:endParaRPr lang="en-US" dirty="0"/>
+          </a:p>
+        </p:txBody>
+      </p:sp>
+      <p:sp>
+        <p:nvSpPr>
+          <p:cNvPr id="3" name="Content Placeholder 2"/>
+          <p:cNvSpPr>
+            <a:spLocks noGrp="1"/>
+          </p:cNvSpPr>
+          <p:nvPr>
+            <p:ph idx="1"/>
           </p:nvPr>
         </p:nvSpPr>
         <p:spPr>
           <a:xfrm>
-            <a:off x="685800" y="1357005"/>
-            <a:ext cx="7772400" cy="1932067"/>
+            <a:off x="457200" y="1417638"/>
+            <a:ext cx="8229600" cy="4708525"/>
           </a:xfrm>
         </p:spPr>
         <p:txBody>
           <a:bodyPr>
-            <a:normAutofit fontScale="90000"/>
+            <a:normAutofit/>
           </a:bodyPr>
           <a:lstStyle/>
           <a:p>
             <a:r>
               <a:rPr lang="en-US" dirty="0" smtClean="0"/>
-              <a:t>Working with Graphic</a:t>
-            </a:r>
-            <a:br>
-              <a:rPr lang="en-US" dirty="0" smtClean="0"/>
-            </a:br>
-            <a:r>
-              <a:rPr lang="en-US" dirty="0" smtClean="0"/>
-              <a:t>Designers</a:t>
-            </a:r>
-            <a:br>
-              <a:rPr lang="en-US" dirty="0" smtClean="0"/>
-            </a:br>
-            <a:r>
-              <a:rPr lang="en-US" sz="3600" i="1" dirty="0" smtClean="0"/>
-              <a:t>Experiences and Lessons Learned</a:t>
-            </a:r>
-            <a:endParaRPr lang="en-US" sz="3600" i="1" dirty="0"/>
-          </a:p>
-        </p:txBody>
-      </p:sp>
-      <p:sp>
-        <p:nvSpPr>
-          <p:cNvPr id="3" name="Subtitle 2"/>
-          <p:cNvSpPr>
-            <a:spLocks noGrp="1"/>
-          </p:cNvSpPr>
-          <p:nvPr>
-            <p:ph type="subTitle" idx="1"/>
-          </p:nvPr>
-        </p:nvSpPr>
-        <p:spPr/>
-        <p:txBody>
-          <a:bodyPr/>
-          <a:lstStyle/>
-          <a:p>
-            <a:r>
-              <a:rPr lang="en-US" dirty="0" smtClean="0"/>
-              <a:t>Robert Nicholson</a:t>
-            </a:r>
-            <a:endParaRPr lang="en-US" dirty="0" smtClean="0"/>
-          </a:p>
-          <a:p>
-            <a:r>
-              <a:rPr lang="en-US" sz="2000" dirty="0" err="1" smtClean="0"/>
-              <a:t>bob-n@wygk.com</a:t>
-            </a:r>
-            <a:endParaRPr lang="en-US" sz="2000" dirty="0"/>
-          </a:p>
-        </p:txBody>
-      </p:sp>
-      <p:sp>
-        <p:nvSpPr>
-          <p:cNvPr id="4" name="Date Placeholder 3"/>
+              <a:t>Graphic Design is Critical to Success</a:t>
+            </a:r>
+          </a:p>
+          <a:p>
+            <a:pPr lvl="1">
+              <a:buFont typeface="Courier New"/>
+              <a:buChar char="o"/>
+            </a:pPr>
+            <a:r>
+              <a:rPr lang="en-US" dirty="0" smtClean="0"/>
+              <a:t>Especially in Consumer Applications</a:t>
+            </a:r>
+          </a:p>
+          <a:p>
+            <a:r>
+              <a:rPr lang="en-US" dirty="0" smtClean="0"/>
+              <a:t>You are </a:t>
+            </a:r>
+            <a:r>
+              <a:rPr lang="en-US" i="1" dirty="0" smtClean="0"/>
+              <a:t>not</a:t>
+            </a:r>
+            <a:r>
+              <a:rPr lang="en-US" dirty="0" smtClean="0"/>
+              <a:t> a Graphic Designer</a:t>
+            </a:r>
+          </a:p>
+          <a:p>
+            <a:pPr lvl="1">
+              <a:buFont typeface="Courier New"/>
+              <a:buChar char="o"/>
+            </a:pPr>
+            <a:r>
+              <a:rPr lang="en-US" dirty="0" smtClean="0"/>
+              <a:t>Designers spend years studying color theory, layout, typography, iconography, graphic development tools, etc.</a:t>
+            </a:r>
+          </a:p>
+          <a:p>
+            <a:r>
+              <a:rPr lang="en-US" dirty="0" smtClean="0"/>
+              <a:t>Design Fashions and Styles change</a:t>
+            </a:r>
+          </a:p>
+          <a:p>
+            <a:pPr lvl="1"/>
+            <a:r>
+              <a:rPr lang="en-US" dirty="0" smtClean="0"/>
+              <a:t>Magazines: by decade; web: by year</a:t>
+            </a:r>
+          </a:p>
+          <a:p>
+            <a:pPr lvl="1"/>
+            <a:r>
+              <a:rPr lang="en-US" dirty="0" smtClean="0"/>
+              <a:t>Current:  Infinite pages, video backgrounds</a:t>
+            </a:r>
+            <a:endParaRPr lang="en-US" dirty="0"/>
+          </a:p>
+        </p:txBody>
+      </p:sp>
+      <p:sp>
+        <p:nvSpPr>
+          <p:cNvPr id="5" name="Date Placeholder 4"/>
           <p:cNvSpPr>
             <a:spLocks noGrp="1"/>
           </p:cNvSpPr>
@@ -5228,13 +5147,13 @@
               <a:rPr lang="en-US" smtClean="0"/>
               <a:t>2/10/15</a:t>
             </a:r>
-            <a:endParaRPr lang="en-US" dirty="0"/>
-          </a:p>
-        </p:txBody>
-      </p:sp>
-      <p:sp>
-        <p:nvSpPr>
-          <p:cNvPr id="5" name="Slide Number Placeholder 4"/>
+            <a:endParaRPr lang="en-US"/>
+          </a:p>
+        </p:txBody>
+      </p:sp>
+      <p:sp>
+        <p:nvSpPr>
+          <p:cNvPr id="6" name="Slide Number Placeholder 5"/>
           <p:cNvSpPr>
             <a:spLocks noGrp="1"/>
           </p:cNvSpPr>
@@ -5247,8 +5166,9 @@
           <a:bodyPr/>
           <a:lstStyle/>
           <a:p>
-            <a:fld id="{04B9895A-707F-8341-BDFC-0D30AAC2A476}" type="slidenum">
-              <a:rPr lang="en-US" smtClean="0"/>
+            <a:fld id="{8A0A27A7-74DC-2A47-9D23-749C6EF32631}" type="slidenum">
+              <a:rPr lang="en-US" smtClean="0"/>
+              <a:pPr/>
               <a:t>15</a:t>
             </a:fld>
             <a:endParaRPr lang="en-US"/>
@@ -5257,7 +5177,7 @@
       </p:sp>
       <p:sp>
         <p:nvSpPr>
-          <p:cNvPr id="6" name="Footer Placeholder 5"/>
+          <p:cNvPr id="4" name="Footer Placeholder 3"/>
           <p:cNvSpPr>
             <a:spLocks noGrp="1"/>
           </p:cNvSpPr>
@@ -5281,20 +5201,13 @@
     </p:spTree>
     <p:extLst>
       <p:ext uri="{BB962C8B-B14F-4D97-AF65-F5344CB8AC3E}">
-        <p14:creationId xmlns:p14="http://schemas.microsoft.com/office/powerpoint/2010/main" val="3500118801"/>
+        <p14:creationId xmlns:p14="http://schemas.microsoft.com/office/powerpoint/2010/main" xmlns="" val="415391380"/>
       </p:ext>
     </p:extLst>
   </p:cSld>
   <p:clrMapOvr>
     <a:masterClrMapping/>
   </p:clrMapOvr>
-  <p:timing>
-    <p:tnLst>
-      <p:par>
-        <p:cTn xmlns:p14="http://schemas.microsoft.com/office/powerpoint/2010/main" id="1" dur="indefinite" restart="never" nodeType="tmRoot"/>
-      </p:par>
-    </p:tnLst>
-  </p:timing>
 </p:sld>
 </file>
 
@@ -5332,7 +5245,7 @@
           <a:p>
             <a:r>
               <a:rPr lang="en-US" dirty="0" smtClean="0"/>
-              <a:t>Design is Important</a:t>
+              <a:t>Trust Your Designer</a:t>
             </a:r>
             <a:endParaRPr lang="en-US" dirty="0"/>
           </a:p>
@@ -5356,13 +5269,45 @@
         </p:spPr>
         <p:txBody>
           <a:bodyPr>
-            <a:normAutofit/>
+            <a:normAutofit fontScale="92500" lnSpcReduction="20000"/>
           </a:bodyPr>
           <a:lstStyle/>
           <a:p>
             <a:r>
               <a:rPr lang="en-US" dirty="0" smtClean="0"/>
-              <a:t>Graphic Design is Critical to Success</a:t>
+              <a:t>Set Individual Preferences Aside</a:t>
+            </a:r>
+          </a:p>
+          <a:p>
+            <a:r>
+              <a:rPr lang="en-US" dirty="0" smtClean="0"/>
+              <a:t>Choose a Designer based on review of past work</a:t>
+            </a:r>
+          </a:p>
+          <a:p>
+            <a:r>
+              <a:rPr lang="en-US" dirty="0" smtClean="0"/>
+              <a:t>Make sure Designer understands requirements</a:t>
+            </a:r>
+          </a:p>
+          <a:p>
+            <a:pPr marL="742950" lvl="2" indent="-342900">
+              <a:buFont typeface="Courier New"/>
+              <a:buChar char="o"/>
+            </a:pPr>
+            <a:r>
+              <a:rPr lang="en-US" dirty="0"/>
+              <a:t>Provide wireframes and </a:t>
+            </a:r>
+            <a:r>
+              <a:rPr lang="en-US" dirty="0" smtClean="0"/>
+              <a:t>list of screen types</a:t>
+            </a:r>
+          </a:p>
+          <a:p>
+            <a:r>
+              <a:rPr lang="en-US" dirty="0" smtClean="0"/>
+              <a:t>Tell designer what you need </a:t>
             </a:r>
           </a:p>
           <a:p>
@@ -5371,59 +5316,39 @@
               <a:buChar char="o"/>
             </a:pPr>
             <a:r>
-              <a:rPr lang="en-US" dirty="0" smtClean="0"/>
-              <a:t>Especially in Consumer Applications</a:t>
-            </a:r>
-          </a:p>
-          <a:p>
-            <a:r>
-              <a:rPr lang="en-US" dirty="0" smtClean="0"/>
-              <a:t>You are </a:t>
-            </a:r>
-            <a:r>
-              <a:rPr lang="en-US" i="1" dirty="0" smtClean="0"/>
-              <a:t>not</a:t>
-            </a:r>
-            <a:r>
-              <a:rPr lang="en-US" dirty="0" smtClean="0"/>
-              <a:t> a Graphic Designer</a:t>
-            </a:r>
-          </a:p>
-          <a:p>
-            <a:pPr lvl="1">
-              <a:buFont typeface="Courier New"/>
-              <a:buChar char="o"/>
-            </a:pPr>
-            <a:r>
-              <a:rPr lang="en-US" dirty="0" smtClean="0"/>
-              <a:t>Designers spend years studying color theory, layout, typography, iconography, graphic development tools, etc.</a:t>
-            </a:r>
-          </a:p>
-          <a:p>
-            <a:r>
-              <a:rPr lang="en-US" dirty="0" smtClean="0"/>
-              <a:t>Design Fashions and Styles </a:t>
-            </a:r>
-            <a:r>
-              <a:rPr lang="en-US" dirty="0" smtClean="0"/>
-              <a:t>change</a:t>
-            </a:r>
-          </a:p>
-          <a:p>
-            <a:pPr lvl="1"/>
-            <a:r>
-              <a:rPr lang="en-US" dirty="0" smtClean="0"/>
-              <a:t>Magazines: by decade; web: by year</a:t>
-            </a:r>
-            <a:endParaRPr lang="en-US" dirty="0" smtClean="0"/>
-          </a:p>
-          <a:p>
-            <a:pPr lvl="1"/>
-            <a:r>
-              <a:rPr lang="en-US" dirty="0" smtClean="0"/>
-              <a:t>Current:  Infinite pages, video backgrounds</a:t>
-            </a:r>
-            <a:endParaRPr lang="en-US" dirty="0"/>
+              <a:rPr lang="en-US" dirty="0" err="1" smtClean="0"/>
+              <a:t>Unflattened</a:t>
+            </a:r>
+            <a:r>
+              <a:rPr lang="en-US" dirty="0" smtClean="0"/>
+              <a:t> Photoshop files, sized icons, font and color specifications, CSS files, etc.</a:t>
+            </a:r>
+          </a:p>
+          <a:p>
+            <a:r>
+              <a:rPr lang="en-US" dirty="0" smtClean="0"/>
+              <a:t>Get early designs and refine</a:t>
+            </a:r>
+          </a:p>
+          <a:p>
+            <a:r>
+              <a:rPr lang="en-US" dirty="0" smtClean="0"/>
+              <a:t>Incorporate graphic design in prototypes</a:t>
+            </a:r>
+          </a:p>
+          <a:p>
+            <a:r>
+              <a:rPr lang="en-US" dirty="0" smtClean="0"/>
+              <a:t>As far as possible, isolate design from code (e.g. </a:t>
+            </a:r>
+            <a:r>
+              <a:rPr lang="en-US" dirty="0" err="1" smtClean="0"/>
+              <a:t>css</a:t>
+            </a:r>
+            <a:r>
+              <a:rPr lang="en-US" dirty="0" smtClean="0"/>
+              <a:t>, WordPress themes)</a:t>
+            </a:r>
           </a:p>
         </p:txBody>
       </p:sp>
@@ -5500,248 +5425,7 @@
     </p:spTree>
     <p:extLst>
       <p:ext uri="{BB962C8B-B14F-4D97-AF65-F5344CB8AC3E}">
-        <p14:creationId xmlns:p14="http://schemas.microsoft.com/office/powerpoint/2010/main" val="415391380"/>
-      </p:ext>
-    </p:extLst>
-  </p:cSld>
-  <p:clrMapOvr>
-    <a:masterClrMapping/>
-  </p:clrMapOvr>
-</p:sld>
-</file>
-
-<file path=ppt/slides/slide17.xml><?xml version="1.0" encoding="utf-8"?>
-<p:sld xmlns:a="http://schemas.openxmlformats.org/drawingml/2006/main" xmlns:r="http://schemas.openxmlformats.org/officeDocument/2006/relationships" xmlns:p="http://schemas.openxmlformats.org/presentationml/2006/main">
-  <p:cSld>
-    <p:spTree>
-      <p:nvGrpSpPr>
-        <p:cNvPr id="1" name=""/>
-        <p:cNvGrpSpPr/>
-        <p:nvPr/>
-      </p:nvGrpSpPr>
-      <p:grpSpPr>
-        <a:xfrm>
-          <a:off x="0" y="0"/>
-          <a:ext cx="0" cy="0"/>
-          <a:chOff x="0" y="0"/>
-          <a:chExt cx="0" cy="0"/>
-        </a:xfrm>
-      </p:grpSpPr>
-      <p:sp>
-        <p:nvSpPr>
-          <p:cNvPr id="2" name="Title 1"/>
-          <p:cNvSpPr>
-            <a:spLocks noGrp="1"/>
-          </p:cNvSpPr>
-          <p:nvPr>
-            <p:ph type="title"/>
-          </p:nvPr>
-        </p:nvSpPr>
-        <p:spPr/>
-        <p:txBody>
-          <a:bodyPr/>
-          <a:lstStyle/>
-          <a:p>
-            <a:r>
-              <a:rPr lang="en-US" dirty="0" smtClean="0"/>
-              <a:t>Trust Your Designer</a:t>
-            </a:r>
-            <a:endParaRPr lang="en-US" dirty="0"/>
-          </a:p>
-        </p:txBody>
-      </p:sp>
-      <p:sp>
-        <p:nvSpPr>
-          <p:cNvPr id="3" name="Content Placeholder 2"/>
-          <p:cNvSpPr>
-            <a:spLocks noGrp="1"/>
-          </p:cNvSpPr>
-          <p:nvPr>
-            <p:ph idx="1"/>
-          </p:nvPr>
-        </p:nvSpPr>
-        <p:spPr>
-          <a:xfrm>
-            <a:off x="457200" y="1417638"/>
-            <a:ext cx="8229600" cy="4708525"/>
-          </a:xfrm>
-        </p:spPr>
-        <p:txBody>
-          <a:bodyPr>
-            <a:normAutofit fontScale="92500" lnSpcReduction="20000"/>
-          </a:bodyPr>
-          <a:lstStyle/>
-          <a:p>
-            <a:r>
-              <a:rPr lang="en-US" dirty="0" smtClean="0"/>
-              <a:t>Set Individual Preferences Aside</a:t>
-            </a:r>
-          </a:p>
-          <a:p>
-            <a:r>
-              <a:rPr lang="en-US" dirty="0" smtClean="0"/>
-              <a:t>Choose a Designer based on </a:t>
-            </a:r>
-            <a:r>
-              <a:rPr lang="en-US" dirty="0" smtClean="0"/>
-              <a:t>review of past </a:t>
-            </a:r>
-            <a:r>
-              <a:rPr lang="en-US" dirty="0" smtClean="0"/>
-              <a:t>work</a:t>
-            </a:r>
-          </a:p>
-          <a:p>
-            <a:r>
-              <a:rPr lang="en-US" dirty="0" smtClean="0"/>
-              <a:t>Make sure Designer understands </a:t>
-            </a:r>
-            <a:r>
-              <a:rPr lang="en-US" dirty="0" smtClean="0"/>
-              <a:t>requirements</a:t>
-            </a:r>
-          </a:p>
-          <a:p>
-            <a:pPr marL="742950" lvl="2" indent="-342900">
-              <a:buFont typeface="Courier New"/>
-              <a:buChar char="o"/>
-            </a:pPr>
-            <a:r>
-              <a:rPr lang="en-US" dirty="0"/>
-              <a:t>Provide wireframes and </a:t>
-            </a:r>
-            <a:r>
-              <a:rPr lang="en-US" dirty="0" smtClean="0"/>
-              <a:t>list of screen types</a:t>
-            </a:r>
-            <a:endParaRPr lang="en-US" dirty="0" smtClean="0"/>
-          </a:p>
-          <a:p>
-            <a:r>
-              <a:rPr lang="en-US" dirty="0" smtClean="0"/>
-              <a:t>Tell designer what you need </a:t>
-            </a:r>
-          </a:p>
-          <a:p>
-            <a:pPr lvl="1">
-              <a:buFont typeface="Courier New"/>
-              <a:buChar char="o"/>
-            </a:pPr>
-            <a:r>
-              <a:rPr lang="en-US" dirty="0" err="1" smtClean="0"/>
-              <a:t>Unflattened</a:t>
-            </a:r>
-            <a:r>
-              <a:rPr lang="en-US" dirty="0" smtClean="0"/>
-              <a:t> </a:t>
-            </a:r>
-            <a:r>
-              <a:rPr lang="en-US" dirty="0" smtClean="0"/>
-              <a:t>Photoshop files, sized icons, font and color specifications, CSS files, etc.</a:t>
-            </a:r>
-          </a:p>
-          <a:p>
-            <a:r>
-              <a:rPr lang="en-US" dirty="0" smtClean="0"/>
-              <a:t>Get early designs and refine</a:t>
-            </a:r>
-          </a:p>
-          <a:p>
-            <a:r>
-              <a:rPr lang="en-US" dirty="0" smtClean="0"/>
-              <a:t>Incorporate graphic design in prototypes</a:t>
-            </a:r>
-          </a:p>
-          <a:p>
-            <a:r>
-              <a:rPr lang="en-US" dirty="0" smtClean="0"/>
-              <a:t>As far as possible, isolate design from code (e.g. </a:t>
-            </a:r>
-            <a:r>
-              <a:rPr lang="en-US" dirty="0" err="1" smtClean="0"/>
-              <a:t>css</a:t>
-            </a:r>
-            <a:r>
-              <a:rPr lang="en-US" dirty="0" smtClean="0"/>
-              <a:t>, WordPress themes)</a:t>
-            </a:r>
-          </a:p>
-        </p:txBody>
-      </p:sp>
-      <p:sp>
-        <p:nvSpPr>
-          <p:cNvPr id="5" name="Date Placeholder 4"/>
-          <p:cNvSpPr>
-            <a:spLocks noGrp="1"/>
-          </p:cNvSpPr>
-          <p:nvPr>
-            <p:ph type="dt" sz="half" idx="10"/>
-          </p:nvPr>
-        </p:nvSpPr>
-        <p:spPr/>
-        <p:txBody>
-          <a:bodyPr/>
-          <a:lstStyle/>
-          <a:p>
-            <a:r>
-              <a:rPr lang="en-US" smtClean="0"/>
-              <a:t>2/10/15</a:t>
-            </a:r>
-            <a:endParaRPr lang="en-US"/>
-          </a:p>
-        </p:txBody>
-      </p:sp>
-      <p:sp>
-        <p:nvSpPr>
-          <p:cNvPr id="6" name="Slide Number Placeholder 5"/>
-          <p:cNvSpPr>
-            <a:spLocks noGrp="1"/>
-          </p:cNvSpPr>
-          <p:nvPr>
-            <p:ph type="sldNum" sz="quarter" idx="12"/>
-          </p:nvPr>
-        </p:nvSpPr>
-        <p:spPr/>
-        <p:txBody>
-          <a:bodyPr/>
-          <a:lstStyle/>
-          <a:p>
-            <a:fld id="{8A0A27A7-74DC-2A47-9D23-749C6EF32631}" type="slidenum">
-              <a:rPr lang="en-US" smtClean="0"/>
-              <a:pPr/>
-              <a:t>17</a:t>
-            </a:fld>
-            <a:endParaRPr lang="en-US"/>
-          </a:p>
-        </p:txBody>
-      </p:sp>
-      <p:sp>
-        <p:nvSpPr>
-          <p:cNvPr id="4" name="Footer Placeholder 3"/>
-          <p:cNvSpPr>
-            <a:spLocks noGrp="1"/>
-          </p:cNvSpPr>
-          <p:nvPr>
-            <p:ph type="ftr" sz="quarter" idx="11"/>
-          </p:nvPr>
-        </p:nvSpPr>
-        <p:spPr/>
-        <p:txBody>
-          <a:bodyPr/>
-          <a:lstStyle/>
-          <a:p>
-            <a:r>
-              <a:rPr lang="en-US" smtClean="0"/>
-              <a:t>Robert Nicholson</a:t>
-            </a:r>
-            <a:endParaRPr lang="en-US"/>
-          </a:p>
-        </p:txBody>
-      </p:sp>
-    </p:spTree>
-    <p:extLst>
-      <p:ext uri="{BB962C8B-B14F-4D97-AF65-F5344CB8AC3E}">
-        <p14:creationId xmlns:p14="http://schemas.microsoft.com/office/powerpoint/2010/main" val="3134213124"/>
+        <p14:creationId xmlns:p14="http://schemas.microsoft.com/office/powerpoint/2010/main" xmlns="" val="3134213124"/>
       </p:ext>
     </p:extLst>
   </p:cSld>
@@ -5752,579 +5436,6 @@
 </file>
 
 <file path=ppt/slides/slide2.xml><?xml version="1.0" encoding="utf-8"?>
-<p:sld xmlns:a="http://schemas.openxmlformats.org/drawingml/2006/main" xmlns:r="http://schemas.openxmlformats.org/officeDocument/2006/relationships" xmlns:p="http://schemas.openxmlformats.org/presentationml/2006/main">
-  <p:cSld>
-    <p:spTree>
-      <p:nvGrpSpPr>
-        <p:cNvPr id="1" name=""/>
-        <p:cNvGrpSpPr/>
-        <p:nvPr/>
-      </p:nvGrpSpPr>
-      <p:grpSpPr>
-        <a:xfrm>
-          <a:off x="0" y="0"/>
-          <a:ext cx="0" cy="0"/>
-          <a:chOff x="0" y="0"/>
-          <a:chExt cx="0" cy="0"/>
-        </a:xfrm>
-      </p:grpSpPr>
-      <p:sp>
-        <p:nvSpPr>
-          <p:cNvPr id="2" name="Title 1"/>
-          <p:cNvSpPr>
-            <a:spLocks noGrp="1"/>
-          </p:cNvSpPr>
-          <p:nvPr>
-            <p:ph type="title"/>
-          </p:nvPr>
-        </p:nvSpPr>
-        <p:spPr>
-          <a:xfrm>
-            <a:off x="457200" y="274638"/>
-            <a:ext cx="8229600" cy="1325562"/>
-          </a:xfrm>
-        </p:spPr>
-        <p:txBody>
-          <a:bodyPr>
-            <a:normAutofit fontScale="90000"/>
-          </a:bodyPr>
-          <a:lstStyle/>
-          <a:p>
-            <a:r>
-              <a:rPr lang="en-US" dirty="0" smtClean="0"/>
-              <a:t>My Background</a:t>
-            </a:r>
-            <a:br>
-              <a:rPr lang="en-US" dirty="0" smtClean="0"/>
-            </a:br>
-            <a:r>
-              <a:rPr lang="en-US" sz="2667" dirty="0" smtClean="0"/>
-              <a:t>BS, Computer Science, California State University, Chico</a:t>
-            </a:r>
-            <a:br>
-              <a:rPr lang="en-US" sz="2667" dirty="0" smtClean="0"/>
-            </a:br>
-            <a:r>
-              <a:rPr lang="en-US" sz="2667" dirty="0" smtClean="0"/>
-              <a:t>MS, Computer Engineering, Stanford University</a:t>
-            </a:r>
-            <a:endParaRPr lang="en-US" sz="2667" dirty="0"/>
-          </a:p>
-        </p:txBody>
-      </p:sp>
-      <p:sp>
-        <p:nvSpPr>
-          <p:cNvPr id="3" name="Content Placeholder 2"/>
-          <p:cNvSpPr>
-            <a:spLocks noGrp="1"/>
-          </p:cNvSpPr>
-          <p:nvPr>
-            <p:ph idx="1"/>
-          </p:nvPr>
-        </p:nvSpPr>
-        <p:spPr>
-          <a:xfrm>
-            <a:off x="457200" y="1878904"/>
-            <a:ext cx="4013560" cy="4247259"/>
-          </a:xfrm>
-        </p:spPr>
-        <p:txBody>
-          <a:bodyPr>
-            <a:normAutofit fontScale="77500" lnSpcReduction="20000"/>
-          </a:bodyPr>
-          <a:lstStyle/>
-          <a:p>
-            <a:r>
-              <a:rPr lang="en-US" dirty="0" smtClean="0"/>
-              <a:t>Hewlett-Packard, </a:t>
-            </a:r>
-            <a:br>
-              <a:rPr lang="en-US" dirty="0" smtClean="0"/>
-            </a:br>
-            <a:r>
-              <a:rPr lang="en-US" dirty="0" smtClean="0"/>
-              <a:t>Software Engineer</a:t>
-            </a:r>
-          </a:p>
-          <a:p>
-            <a:r>
-              <a:rPr lang="en-US" dirty="0" err="1" smtClean="0"/>
-              <a:t>Sydis</a:t>
-            </a:r>
-            <a:r>
-              <a:rPr lang="en-US" dirty="0" smtClean="0"/>
-              <a:t> Inc, </a:t>
-            </a:r>
-            <a:br>
-              <a:rPr lang="en-US" dirty="0" smtClean="0"/>
-            </a:br>
-            <a:r>
-              <a:rPr lang="en-US" dirty="0" smtClean="0"/>
-              <a:t>Engineering Manager</a:t>
-            </a:r>
-          </a:p>
-          <a:p>
-            <a:r>
-              <a:rPr lang="en-US" dirty="0" smtClean="0"/>
-              <a:t>Cognitive Concepts, Founder</a:t>
-            </a:r>
-          </a:p>
-          <a:p>
-            <a:r>
-              <a:rPr lang="en-US" dirty="0" smtClean="0"/>
-              <a:t>Plexus, </a:t>
-            </a:r>
-            <a:br>
-              <a:rPr lang="en-US" dirty="0" smtClean="0"/>
-            </a:br>
-            <a:r>
-              <a:rPr lang="en-US" dirty="0" smtClean="0"/>
-              <a:t>Engineering Manager</a:t>
-            </a:r>
-          </a:p>
-          <a:p>
-            <a:r>
-              <a:rPr lang="en-US" dirty="0" smtClean="0"/>
-              <a:t>Oracle, </a:t>
-            </a:r>
-            <a:br>
-              <a:rPr lang="en-US" dirty="0" smtClean="0"/>
-            </a:br>
-            <a:r>
-              <a:rPr lang="en-US" dirty="0" smtClean="0"/>
-              <a:t>Engineering Director</a:t>
-            </a:r>
-          </a:p>
-          <a:p>
-            <a:r>
-              <a:rPr lang="en-US" dirty="0" smtClean="0"/>
-              <a:t>Silicon Graphics / AT&amp;T, Engineering Manager</a:t>
-            </a:r>
-            <a:endParaRPr lang="en-US" dirty="0"/>
-          </a:p>
-        </p:txBody>
-      </p:sp>
-      <p:sp>
-        <p:nvSpPr>
-          <p:cNvPr id="4" name="Content Placeholder 2"/>
-          <p:cNvSpPr txBox="1">
-            <a:spLocks/>
-          </p:cNvSpPr>
-          <p:nvPr/>
-        </p:nvSpPr>
-        <p:spPr>
-          <a:xfrm>
-            <a:off x="4574430" y="1878904"/>
-            <a:ext cx="4112370" cy="4247259"/>
-          </a:xfrm>
-          <a:prstGeom prst="rect">
-            <a:avLst/>
-          </a:prstGeom>
-        </p:spPr>
-        <p:txBody>
-          <a:bodyPr vert="horz" lIns="91440" tIns="45720" rIns="91440" bIns="45720" rtlCol="0">
-            <a:normAutofit fontScale="77500" lnSpcReduction="20000"/>
-          </a:bodyPr>
-          <a:lstStyle/>
-          <a:p>
-            <a:pPr marL="342900" marR="0" lvl="0" indent="-342900" algn="l" defTabSz="457200" rtl="0" eaLnBrk="1" fontAlgn="auto" latinLnBrk="0" hangingPunct="1">
-              <a:lnSpc>
-                <a:spcPct val="100000"/>
-              </a:lnSpc>
-              <a:spcBef>
-                <a:spcPct val="20000"/>
-              </a:spcBef>
-              <a:spcAft>
-                <a:spcPts val="0"/>
-              </a:spcAft>
-              <a:buClrTx/>
-              <a:buSzTx/>
-              <a:buFont typeface="Arial"/>
-              <a:buChar char="•"/>
-              <a:tabLst/>
-              <a:defRPr/>
-            </a:pPr>
-            <a:r>
-              <a:rPr lang="en-US" sz="3200" dirty="0" smtClean="0"/>
-              <a:t>Sun Microsystems, Engineering Director</a:t>
-            </a:r>
-          </a:p>
-          <a:p>
-            <a:pPr marL="342900" marR="0" lvl="0" indent="-342900" algn="l" defTabSz="457200" rtl="0" eaLnBrk="1" fontAlgn="auto" latinLnBrk="0" hangingPunct="1">
-              <a:lnSpc>
-                <a:spcPct val="100000"/>
-              </a:lnSpc>
-              <a:spcBef>
-                <a:spcPct val="20000"/>
-              </a:spcBef>
-              <a:spcAft>
-                <a:spcPts val="0"/>
-              </a:spcAft>
-              <a:buClrTx/>
-              <a:buSzTx/>
-              <a:buFont typeface="Arial"/>
-              <a:buChar char="•"/>
-              <a:tabLst/>
-              <a:defRPr/>
-            </a:pPr>
-            <a:r>
-              <a:rPr kumimoji="0" lang="en-US" sz="3200" b="0" i="0" u="none" strike="noStrike" kern="1200" cap="none" spc="0" normalizeH="0" baseline="0" noProof="0" dirty="0" err="1" smtClean="0">
-                <a:ln>
-                  <a:noFill/>
-                </a:ln>
-                <a:solidFill>
-                  <a:schemeClr val="tx1"/>
-                </a:solidFill>
-                <a:effectLst/>
-                <a:uLnTx/>
-                <a:uFillTx/>
-                <a:latin typeface="+mn-lt"/>
-                <a:ea typeface="+mn-ea"/>
-                <a:cs typeface="+mn-cs"/>
-              </a:rPr>
-              <a:t>InterSurvey</a:t>
-            </a:r>
-            <a:r>
-              <a:rPr kumimoji="0" lang="en-US" sz="3200" b="0" i="0" u="none" strike="noStrike" kern="1200" cap="none" spc="0" normalizeH="0" baseline="0" noProof="0" dirty="0" smtClean="0">
-                <a:ln>
-                  <a:noFill/>
-                </a:ln>
-                <a:solidFill>
-                  <a:schemeClr val="tx1"/>
-                </a:solidFill>
-                <a:effectLst/>
-                <a:uLnTx/>
-                <a:uFillTx/>
-                <a:latin typeface="+mn-lt"/>
-                <a:ea typeface="+mn-ea"/>
-                <a:cs typeface="+mn-cs"/>
-              </a:rPr>
-              <a:t>,</a:t>
-            </a:r>
-            <a:r>
-              <a:rPr kumimoji="0" lang="en-US" sz="3200" b="0" i="0" u="none" strike="noStrike" kern="1200" cap="none" spc="0" normalizeH="0" noProof="0" dirty="0" smtClean="0">
-                <a:ln>
-                  <a:noFill/>
-                </a:ln>
-                <a:solidFill>
-                  <a:schemeClr val="tx1"/>
-                </a:solidFill>
-                <a:effectLst/>
-                <a:uLnTx/>
-                <a:uFillTx/>
-                <a:latin typeface="+mn-lt"/>
-                <a:ea typeface="+mn-ea"/>
-                <a:cs typeface="+mn-cs"/>
-              </a:rPr>
-              <a:t> </a:t>
-            </a:r>
-            <a:br>
-              <a:rPr kumimoji="0" lang="en-US" sz="3200" b="0" i="0" u="none" strike="noStrike" kern="1200" cap="none" spc="0" normalizeH="0" noProof="0" dirty="0" smtClean="0">
-                <a:ln>
-                  <a:noFill/>
-                </a:ln>
-                <a:solidFill>
-                  <a:schemeClr val="tx1"/>
-                </a:solidFill>
-                <a:effectLst/>
-                <a:uLnTx/>
-                <a:uFillTx/>
-                <a:latin typeface="+mn-lt"/>
-                <a:ea typeface="+mn-ea"/>
-                <a:cs typeface="+mn-cs"/>
-              </a:rPr>
-            </a:br>
-            <a:r>
-              <a:rPr kumimoji="0" lang="en-US" sz="3200" b="0" i="0" u="none" strike="noStrike" kern="1200" cap="none" spc="0" normalizeH="0" noProof="0" dirty="0" smtClean="0">
-                <a:ln>
-                  <a:noFill/>
-                </a:ln>
-                <a:solidFill>
-                  <a:schemeClr val="tx1"/>
-                </a:solidFill>
-                <a:effectLst/>
-                <a:uLnTx/>
-                <a:uFillTx/>
-                <a:latin typeface="+mn-lt"/>
-                <a:ea typeface="+mn-ea"/>
-                <a:cs typeface="+mn-cs"/>
-              </a:rPr>
-              <a:t>VP of Engineering</a:t>
-            </a:r>
-          </a:p>
-          <a:p>
-            <a:pPr marL="342900" marR="0" lvl="0" indent="-342900" algn="l" defTabSz="457200" rtl="0" eaLnBrk="1" fontAlgn="auto" latinLnBrk="0" hangingPunct="1">
-              <a:lnSpc>
-                <a:spcPct val="100000"/>
-              </a:lnSpc>
-              <a:spcBef>
-                <a:spcPct val="20000"/>
-              </a:spcBef>
-              <a:spcAft>
-                <a:spcPts val="0"/>
-              </a:spcAft>
-              <a:buClrTx/>
-              <a:buSzTx/>
-              <a:buFont typeface="Arial"/>
-              <a:buChar char="•"/>
-              <a:tabLst/>
-              <a:defRPr/>
-            </a:pPr>
-            <a:r>
-              <a:rPr lang="en-US" sz="3200" baseline="0" dirty="0" err="1" smtClean="0"/>
-              <a:t>StockMaster</a:t>
-            </a:r>
-            <a:r>
-              <a:rPr lang="en-US" sz="3200" dirty="0" smtClean="0"/>
-              <a:t> / Red Herring, VP of Engineering</a:t>
-            </a:r>
-          </a:p>
-          <a:p>
-            <a:pPr marL="342900" marR="0" lvl="0" indent="-342900" algn="l" defTabSz="457200" rtl="0" eaLnBrk="1" fontAlgn="auto" latinLnBrk="0" hangingPunct="1">
-              <a:lnSpc>
-                <a:spcPct val="100000"/>
-              </a:lnSpc>
-              <a:spcBef>
-                <a:spcPct val="20000"/>
-              </a:spcBef>
-              <a:spcAft>
-                <a:spcPts val="0"/>
-              </a:spcAft>
-              <a:buClrTx/>
-              <a:buSzTx/>
-              <a:buFont typeface="Arial"/>
-              <a:buChar char="•"/>
-              <a:tabLst/>
-              <a:defRPr/>
-            </a:pPr>
-            <a:r>
-              <a:rPr kumimoji="0" lang="en-US" sz="3200" b="0" i="0" u="none" strike="noStrike" kern="1200" cap="none" spc="0" normalizeH="0" baseline="0" noProof="0" dirty="0" err="1" smtClean="0">
-                <a:ln>
-                  <a:noFill/>
-                </a:ln>
-                <a:solidFill>
-                  <a:schemeClr val="tx1"/>
-                </a:solidFill>
-                <a:effectLst/>
-                <a:uLnTx/>
-                <a:uFillTx/>
-                <a:latin typeface="+mn-lt"/>
-                <a:ea typeface="+mn-ea"/>
-                <a:cs typeface="+mn-cs"/>
-              </a:rPr>
-              <a:t>Ratingz</a:t>
-            </a:r>
-            <a:r>
-              <a:rPr kumimoji="0" lang="en-US" sz="3200" b="0" i="0" u="none" strike="noStrike" kern="1200" cap="none" spc="0" normalizeH="0" noProof="0" dirty="0" smtClean="0">
-                <a:ln>
-                  <a:noFill/>
-                </a:ln>
-                <a:solidFill>
-                  <a:schemeClr val="tx1"/>
-                </a:solidFill>
-                <a:effectLst/>
-                <a:uLnTx/>
-                <a:uFillTx/>
-                <a:latin typeface="+mn-lt"/>
-                <a:ea typeface="+mn-ea"/>
-                <a:cs typeface="+mn-cs"/>
-              </a:rPr>
-              <a:t> Inc, </a:t>
-            </a:r>
-            <a:r>
-              <a:rPr lang="en-US" sz="3200" dirty="0" smtClean="0"/>
-              <a:t>Co-Founder, </a:t>
-            </a:r>
-            <a:br>
-              <a:rPr lang="en-US" sz="3200" dirty="0" smtClean="0"/>
-            </a:br>
-            <a:r>
-              <a:rPr lang="en-US" sz="3200" dirty="0" smtClean="0"/>
-              <a:t>VP of Marketing</a:t>
-            </a:r>
-          </a:p>
-          <a:p>
-            <a:pPr marL="342900" marR="0" lvl="0" indent="-342900" algn="l" defTabSz="457200" rtl="0" eaLnBrk="1" fontAlgn="auto" latinLnBrk="0" hangingPunct="1">
-              <a:lnSpc>
-                <a:spcPct val="100000"/>
-              </a:lnSpc>
-              <a:spcBef>
-                <a:spcPct val="20000"/>
-              </a:spcBef>
-              <a:spcAft>
-                <a:spcPts val="0"/>
-              </a:spcAft>
-              <a:buClrTx/>
-              <a:buSzTx/>
-              <a:buFont typeface="Arial"/>
-              <a:buChar char="•"/>
-              <a:tabLst/>
-              <a:defRPr/>
-            </a:pPr>
-            <a:r>
-              <a:rPr kumimoji="0" lang="en-US" sz="3200" b="0" i="0" u="none" strike="noStrike" kern="1200" cap="none" spc="0" normalizeH="0" baseline="0" noProof="0" dirty="0" smtClean="0">
-                <a:ln>
-                  <a:noFill/>
-                </a:ln>
-                <a:solidFill>
-                  <a:schemeClr val="tx1"/>
-                </a:solidFill>
-                <a:effectLst/>
-                <a:uLnTx/>
-                <a:uFillTx/>
-                <a:latin typeface="+mn-lt"/>
-                <a:ea typeface="+mn-ea"/>
-                <a:cs typeface="+mn-cs"/>
-              </a:rPr>
-              <a:t>LunaGraphica</a:t>
-            </a:r>
-            <a:r>
-              <a:rPr kumimoji="0" lang="en-US" sz="3200" b="0" i="0" u="none" strike="noStrike" kern="1200" cap="none" spc="0" normalizeH="0" noProof="0" dirty="0" smtClean="0">
-                <a:ln>
-                  <a:noFill/>
-                </a:ln>
-                <a:solidFill>
-                  <a:schemeClr val="tx1"/>
-                </a:solidFill>
-                <a:effectLst/>
-                <a:uLnTx/>
-                <a:uFillTx/>
-                <a:latin typeface="+mn-lt"/>
-                <a:ea typeface="+mn-ea"/>
-                <a:cs typeface="+mn-cs"/>
-              </a:rPr>
-              <a:t> Inc, Co-Founder, VP of Technology</a:t>
-            </a:r>
-          </a:p>
-          <a:p>
-            <a:pPr marL="342900" marR="0" lvl="0" indent="-342900" algn="l" defTabSz="457200" rtl="0" eaLnBrk="1" fontAlgn="auto" latinLnBrk="0" hangingPunct="1">
-              <a:lnSpc>
-                <a:spcPct val="100000"/>
-              </a:lnSpc>
-              <a:spcBef>
-                <a:spcPct val="20000"/>
-              </a:spcBef>
-              <a:spcAft>
-                <a:spcPts val="0"/>
-              </a:spcAft>
-              <a:buClrTx/>
-              <a:buSzTx/>
-              <a:buFont typeface="Arial"/>
-              <a:buChar char="•"/>
-              <a:tabLst/>
-              <a:defRPr/>
-            </a:pPr>
-            <a:r>
-              <a:rPr lang="en-US" sz="3200" baseline="0" dirty="0" smtClean="0"/>
-              <a:t>Entrepreneur</a:t>
-            </a:r>
-            <a:r>
-              <a:rPr lang="en-US" sz="3200" dirty="0" smtClean="0"/>
-              <a:t> and Independent Consultant</a:t>
-            </a:r>
-            <a:endParaRPr kumimoji="0" lang="en-US" sz="3200" b="0" i="0" u="none" strike="noStrike" kern="1200" cap="none" spc="0" normalizeH="0" baseline="0" noProof="0" dirty="0" smtClean="0">
-              <a:ln>
-                <a:noFill/>
-              </a:ln>
-              <a:solidFill>
-                <a:schemeClr val="tx1"/>
-              </a:solidFill>
-              <a:effectLst/>
-              <a:uLnTx/>
-              <a:uFillTx/>
-              <a:latin typeface="+mn-lt"/>
-              <a:ea typeface="+mn-ea"/>
-              <a:cs typeface="+mn-cs"/>
-            </a:endParaRPr>
-          </a:p>
-        </p:txBody>
-      </p:sp>
-      <p:sp>
-        <p:nvSpPr>
-          <p:cNvPr id="5" name="Date Placeholder 4"/>
-          <p:cNvSpPr>
-            <a:spLocks noGrp="1"/>
-          </p:cNvSpPr>
-          <p:nvPr>
-            <p:ph type="dt" sz="half" idx="10"/>
-          </p:nvPr>
-        </p:nvSpPr>
-        <p:spPr/>
-        <p:txBody>
-          <a:bodyPr/>
-          <a:lstStyle/>
-          <a:p>
-            <a:r>
-              <a:rPr lang="en-US" smtClean="0"/>
-              <a:t>2/10/15</a:t>
-            </a:r>
-            <a:endParaRPr lang="en-US"/>
-          </a:p>
-        </p:txBody>
-      </p:sp>
-      <p:sp>
-        <p:nvSpPr>
-          <p:cNvPr id="6" name="Slide Number Placeholder 5"/>
-          <p:cNvSpPr>
-            <a:spLocks noGrp="1"/>
-          </p:cNvSpPr>
-          <p:nvPr>
-            <p:ph type="sldNum" sz="quarter" idx="12"/>
-          </p:nvPr>
-        </p:nvSpPr>
-        <p:spPr/>
-        <p:txBody>
-          <a:bodyPr/>
-          <a:lstStyle/>
-          <a:p>
-            <a:fld id="{8A0A27A7-74DC-2A47-9D23-749C6EF32631}" type="slidenum">
-              <a:rPr lang="en-US" smtClean="0"/>
-              <a:pPr/>
-              <a:t>2</a:t>
-            </a:fld>
-            <a:endParaRPr lang="en-US"/>
-          </a:p>
-        </p:txBody>
-      </p:sp>
-      <p:sp>
-        <p:nvSpPr>
-          <p:cNvPr id="7" name="Footer Placeholder 6"/>
-          <p:cNvSpPr>
-            <a:spLocks noGrp="1"/>
-          </p:cNvSpPr>
-          <p:nvPr>
-            <p:ph type="ftr" sz="quarter" idx="11"/>
-          </p:nvPr>
-        </p:nvSpPr>
-        <p:spPr/>
-        <p:txBody>
-          <a:bodyPr/>
-          <a:lstStyle/>
-          <a:p>
-            <a:r>
-              <a:rPr lang="en-US" smtClean="0"/>
-              <a:t>Robert Nicholson</a:t>
-            </a:r>
-            <a:endParaRPr lang="en-US"/>
-          </a:p>
-        </p:txBody>
-      </p:sp>
-    </p:spTree>
-  </p:cSld>
-  <p:clrMapOvr>
-    <a:masterClrMapping/>
-  </p:clrMapOvr>
-  <p:timing>
-    <p:tnLst>
-      <p:par>
-        <p:cTn xmlns:p14="http://schemas.microsoft.com/office/powerpoint/2010/main" id="1" dur="indefinite" restart="never" nodeType="tmRoot"/>
-      </p:par>
-    </p:tnLst>
-  </p:timing>
-</p:sld>
-</file>
-
-<file path=ppt/slides/slide3.xml><?xml version="1.0" encoding="utf-8"?>
 <p:sld xmlns:a="http://schemas.openxmlformats.org/drawingml/2006/main" xmlns:r="http://schemas.openxmlformats.org/officeDocument/2006/relationships" xmlns:p="http://schemas.openxmlformats.org/presentationml/2006/main">
   <p:cSld>
     <p:spTree>
@@ -6552,7 +5663,7 @@
             <a:fld id="{8A0A27A7-74DC-2A47-9D23-749C6EF32631}" type="slidenum">
               <a:rPr lang="en-US" smtClean="0"/>
               <a:pPr/>
-              <a:t>3</a:t>
+              <a:t>2</a:t>
             </a:fld>
             <a:endParaRPr lang="en-US"/>
           </a:p>
@@ -6589,7 +5700,250 @@
   <p:timing>
     <p:tnLst>
       <p:par>
-        <p:cTn xmlns:p14="http://schemas.microsoft.com/office/powerpoint/2010/main" id="1" dur="indefinite" restart="never" nodeType="tmRoot"/>
+        <p:cTn id="1" dur="indefinite" restart="never" nodeType="tmRoot"/>
+      </p:par>
+    </p:tnLst>
+  </p:timing>
+</p:sld>
+</file>
+
+<file path=ppt/slides/slide3.xml><?xml version="1.0" encoding="utf-8"?>
+<p:sld xmlns:a="http://schemas.openxmlformats.org/drawingml/2006/main" xmlns:r="http://schemas.openxmlformats.org/officeDocument/2006/relationships" xmlns:p="http://schemas.openxmlformats.org/presentationml/2006/main">
+  <p:cSld>
+    <p:spTree>
+      <p:nvGrpSpPr>
+        <p:cNvPr id="1" name=""/>
+        <p:cNvGrpSpPr/>
+        <p:nvPr/>
+      </p:nvGrpSpPr>
+      <p:grpSpPr>
+        <a:xfrm>
+          <a:off x="0" y="0"/>
+          <a:ext cx="0" cy="0"/>
+          <a:chOff x="0" y="0"/>
+          <a:chExt cx="0" cy="0"/>
+        </a:xfrm>
+      </p:grpSpPr>
+      <p:sp>
+        <p:nvSpPr>
+          <p:cNvPr id="2" name="Title 1"/>
+          <p:cNvSpPr>
+            <a:spLocks noGrp="1"/>
+          </p:cNvSpPr>
+          <p:nvPr>
+            <p:ph type="title"/>
+          </p:nvPr>
+        </p:nvSpPr>
+        <p:spPr/>
+        <p:txBody>
+          <a:bodyPr/>
+          <a:lstStyle/>
+          <a:p>
+            <a:r>
+              <a:rPr lang="en-US" dirty="0" smtClean="0"/>
+              <a:t>“Requirements” Phases</a:t>
+            </a:r>
+            <a:endParaRPr lang="en-US" dirty="0"/>
+          </a:p>
+        </p:txBody>
+      </p:sp>
+      <p:sp>
+        <p:nvSpPr>
+          <p:cNvPr id="3" name="Content Placeholder 2"/>
+          <p:cNvSpPr>
+            <a:spLocks noGrp="1"/>
+          </p:cNvSpPr>
+          <p:nvPr>
+            <p:ph idx="1"/>
+          </p:nvPr>
+        </p:nvSpPr>
+        <p:spPr/>
+        <p:txBody>
+          <a:bodyPr>
+            <a:normAutofit fontScale="92500" lnSpcReduction="20000"/>
+          </a:bodyPr>
+          <a:lstStyle/>
+          <a:p>
+            <a:pPr lvl="0">
+              <a:defRPr/>
+            </a:pPr>
+            <a:r>
+              <a:rPr lang="en-US" dirty="0" smtClean="0"/>
+              <a:t>Pre-Project:</a:t>
+            </a:r>
+          </a:p>
+          <a:p>
+            <a:pPr marL="800100" lvl="1" indent="-342900">
+              <a:buFont typeface="Courier New"/>
+              <a:buChar char="o"/>
+            </a:pPr>
+            <a:r>
+              <a:rPr lang="en-US" sz="3200" dirty="0"/>
+              <a:t>Research </a:t>
+            </a:r>
+            <a:r>
+              <a:rPr lang="en-US" sz="3200" dirty="0" smtClean="0"/>
+              <a:t>Requirements from scratch</a:t>
+            </a:r>
+            <a:endParaRPr lang="en-US" sz="3200" dirty="0"/>
+          </a:p>
+          <a:p>
+            <a:pPr marL="800100" lvl="1" indent="-342900">
+              <a:buFont typeface="Courier New"/>
+              <a:buChar char="o"/>
+            </a:pPr>
+            <a:r>
+              <a:rPr lang="en-US" sz="3200" dirty="0" smtClean="0"/>
+              <a:t>RFP (Request For Proposal) *</a:t>
+            </a:r>
+          </a:p>
+          <a:p>
+            <a:pPr marL="800100" lvl="1" indent="-342900">
+              <a:buFont typeface="Courier New"/>
+              <a:buChar char="o"/>
+            </a:pPr>
+            <a:r>
+              <a:rPr lang="en-US" sz="3200" dirty="0" smtClean="0"/>
+              <a:t>Marketing Requirements</a:t>
+            </a:r>
+          </a:p>
+          <a:p>
+            <a:pPr lvl="0">
+              <a:defRPr/>
+            </a:pPr>
+            <a:r>
+              <a:rPr lang="en-US" dirty="0" smtClean="0"/>
+              <a:t>Project Initiation</a:t>
+            </a:r>
+          </a:p>
+          <a:p>
+            <a:pPr marL="800100" lvl="1" indent="-342900">
+              <a:buFont typeface="Courier New"/>
+              <a:buChar char="o"/>
+            </a:pPr>
+            <a:r>
+              <a:rPr lang="en-US" sz="3200" dirty="0" smtClean="0"/>
+              <a:t>Requirements Gathering / Refining</a:t>
+            </a:r>
+          </a:p>
+          <a:p>
+            <a:pPr marL="400050"/>
+            <a:r>
+              <a:rPr lang="en-US" dirty="0" smtClean="0"/>
+              <a:t>In-Progress Project Review(s)</a:t>
+            </a:r>
+          </a:p>
+          <a:p>
+            <a:pPr marL="800100" lvl="1">
+              <a:buFont typeface="Courier New"/>
+              <a:buChar char="o"/>
+            </a:pPr>
+            <a:r>
+              <a:rPr lang="en-US" dirty="0" smtClean="0"/>
+              <a:t>Change Requirements</a:t>
+            </a:r>
+          </a:p>
+          <a:p>
+            <a:pPr lvl="0">
+              <a:defRPr/>
+            </a:pPr>
+            <a:r>
+              <a:rPr lang="en-US" dirty="0" smtClean="0"/>
+              <a:t>Web / Desktop Applications / Mobile Apps</a:t>
+            </a:r>
+            <a:endParaRPr lang="en-US" dirty="0"/>
+          </a:p>
+          <a:p>
+            <a:pPr marL="800100" lvl="1">
+              <a:buFont typeface="Courier New"/>
+              <a:buChar char="o"/>
+            </a:pPr>
+            <a:r>
+              <a:rPr lang="en-US" dirty="0" smtClean="0"/>
+              <a:t>Different Release Cycles</a:t>
+            </a:r>
+          </a:p>
+        </p:txBody>
+      </p:sp>
+      <p:sp>
+        <p:nvSpPr>
+          <p:cNvPr id="4" name="Date Placeholder 3"/>
+          <p:cNvSpPr>
+            <a:spLocks noGrp="1"/>
+          </p:cNvSpPr>
+          <p:nvPr>
+            <p:ph type="dt" sz="half" idx="10"/>
+          </p:nvPr>
+        </p:nvSpPr>
+        <p:spPr/>
+        <p:txBody>
+          <a:bodyPr/>
+          <a:lstStyle/>
+          <a:p>
+            <a:r>
+              <a:rPr lang="en-US" smtClean="0"/>
+              <a:t>2/10/15</a:t>
+            </a:r>
+            <a:endParaRPr lang="en-US"/>
+          </a:p>
+        </p:txBody>
+      </p:sp>
+      <p:sp>
+        <p:nvSpPr>
+          <p:cNvPr id="5" name="Slide Number Placeholder 4"/>
+          <p:cNvSpPr>
+            <a:spLocks noGrp="1"/>
+          </p:cNvSpPr>
+          <p:nvPr>
+            <p:ph type="sldNum" sz="quarter" idx="12"/>
+          </p:nvPr>
+        </p:nvSpPr>
+        <p:spPr/>
+        <p:txBody>
+          <a:bodyPr/>
+          <a:lstStyle/>
+          <a:p>
+            <a:fld id="{8A0A27A7-74DC-2A47-9D23-749C6EF32631}" type="slidenum">
+              <a:rPr lang="en-US" smtClean="0"/>
+              <a:pPr/>
+              <a:t>3</a:t>
+            </a:fld>
+            <a:endParaRPr lang="en-US"/>
+          </a:p>
+        </p:txBody>
+      </p:sp>
+      <p:sp>
+        <p:nvSpPr>
+          <p:cNvPr id="6" name="Footer Placeholder 5"/>
+          <p:cNvSpPr>
+            <a:spLocks noGrp="1"/>
+          </p:cNvSpPr>
+          <p:nvPr>
+            <p:ph type="ftr" sz="quarter" idx="11"/>
+          </p:nvPr>
+        </p:nvSpPr>
+        <p:spPr/>
+        <p:txBody>
+          <a:bodyPr/>
+          <a:lstStyle/>
+          <a:p>
+            <a:r>
+              <a:rPr lang="en-US" smtClean="0"/>
+              <a:t>Robert Nicholson</a:t>
+            </a:r>
+            <a:endParaRPr lang="en-US"/>
+          </a:p>
+        </p:txBody>
+      </p:sp>
+    </p:spTree>
+  </p:cSld>
+  <p:clrMapOvr>
+    <a:masterClrMapping/>
+  </p:clrMapOvr>
+  <p:timing>
+    <p:tnLst>
+      <p:par>
+        <p:cTn id="1" dur="indefinite" restart="never" nodeType="tmRoot"/>
       </p:par>
     </p:tnLst>
   </p:timing>
@@ -6623,249 +5977,6 @@
             <p:ph type="title"/>
           </p:nvPr>
         </p:nvSpPr>
-        <p:spPr/>
-        <p:txBody>
-          <a:bodyPr/>
-          <a:lstStyle/>
-          <a:p>
-            <a:r>
-              <a:rPr lang="en-US" dirty="0" smtClean="0"/>
-              <a:t>“Requirements” Phases</a:t>
-            </a:r>
-            <a:endParaRPr lang="en-US" dirty="0"/>
-          </a:p>
-        </p:txBody>
-      </p:sp>
-      <p:sp>
-        <p:nvSpPr>
-          <p:cNvPr id="3" name="Content Placeholder 2"/>
-          <p:cNvSpPr>
-            <a:spLocks noGrp="1"/>
-          </p:cNvSpPr>
-          <p:nvPr>
-            <p:ph idx="1"/>
-          </p:nvPr>
-        </p:nvSpPr>
-        <p:spPr/>
-        <p:txBody>
-          <a:bodyPr>
-            <a:normAutofit fontScale="92500" lnSpcReduction="20000"/>
-          </a:bodyPr>
-          <a:lstStyle/>
-          <a:p>
-            <a:pPr lvl="0">
-              <a:defRPr/>
-            </a:pPr>
-            <a:r>
-              <a:rPr lang="en-US" dirty="0" smtClean="0"/>
-              <a:t>Pre-Project:</a:t>
-            </a:r>
-          </a:p>
-          <a:p>
-            <a:pPr marL="800100" lvl="1" indent="-342900">
-              <a:buFont typeface="Courier New"/>
-              <a:buChar char="o"/>
-            </a:pPr>
-            <a:r>
-              <a:rPr lang="en-US" sz="3200" dirty="0"/>
-              <a:t>Research </a:t>
-            </a:r>
-            <a:r>
-              <a:rPr lang="en-US" sz="3200" dirty="0" smtClean="0"/>
-              <a:t>Requirements from scratch</a:t>
-            </a:r>
-            <a:endParaRPr lang="en-US" sz="3200" dirty="0"/>
-          </a:p>
-          <a:p>
-            <a:pPr marL="800100" lvl="1" indent="-342900">
-              <a:buFont typeface="Courier New"/>
-              <a:buChar char="o"/>
-            </a:pPr>
-            <a:r>
-              <a:rPr lang="en-US" sz="3200" dirty="0" smtClean="0"/>
-              <a:t>RFP (Request For Proposal) *</a:t>
-            </a:r>
-          </a:p>
-          <a:p>
-            <a:pPr marL="800100" lvl="1" indent="-342900">
-              <a:buFont typeface="Courier New"/>
-              <a:buChar char="o"/>
-            </a:pPr>
-            <a:r>
-              <a:rPr lang="en-US" sz="3200" dirty="0" smtClean="0"/>
-              <a:t>Marketing Requirements</a:t>
-            </a:r>
-          </a:p>
-          <a:p>
-            <a:pPr lvl="0">
-              <a:defRPr/>
-            </a:pPr>
-            <a:r>
-              <a:rPr lang="en-US" dirty="0" smtClean="0"/>
-              <a:t>Project Initiation</a:t>
-            </a:r>
-          </a:p>
-          <a:p>
-            <a:pPr marL="800100" lvl="1" indent="-342900">
-              <a:buFont typeface="Courier New"/>
-              <a:buChar char="o"/>
-            </a:pPr>
-            <a:r>
-              <a:rPr lang="en-US" sz="3200" dirty="0" smtClean="0"/>
-              <a:t>Requirements Gathering / Refining</a:t>
-            </a:r>
-          </a:p>
-          <a:p>
-            <a:pPr marL="400050"/>
-            <a:r>
-              <a:rPr lang="en-US" dirty="0" smtClean="0"/>
-              <a:t>In-Progress Project Review(s)</a:t>
-            </a:r>
-          </a:p>
-          <a:p>
-            <a:pPr marL="800100" lvl="1">
-              <a:buFont typeface="Courier New"/>
-              <a:buChar char="o"/>
-            </a:pPr>
-            <a:r>
-              <a:rPr lang="en-US" dirty="0" smtClean="0"/>
-              <a:t>Change Requirements</a:t>
-            </a:r>
-          </a:p>
-          <a:p>
-            <a:pPr lvl="0">
-              <a:defRPr/>
-            </a:pPr>
-            <a:r>
-              <a:rPr lang="en-US" dirty="0" smtClean="0"/>
-              <a:t>Web / Desktop Applications / Mobile Apps</a:t>
-            </a:r>
-            <a:endParaRPr lang="en-US" dirty="0"/>
-          </a:p>
-          <a:p>
-            <a:pPr marL="800100" lvl="1">
-              <a:buFont typeface="Courier New"/>
-              <a:buChar char="o"/>
-            </a:pPr>
-            <a:r>
-              <a:rPr lang="en-US" dirty="0" smtClean="0"/>
-              <a:t>Different Release Cycles</a:t>
-            </a:r>
-          </a:p>
-        </p:txBody>
-      </p:sp>
-      <p:sp>
-        <p:nvSpPr>
-          <p:cNvPr id="4" name="Date Placeholder 3"/>
-          <p:cNvSpPr>
-            <a:spLocks noGrp="1"/>
-          </p:cNvSpPr>
-          <p:nvPr>
-            <p:ph type="dt" sz="half" idx="10"/>
-          </p:nvPr>
-        </p:nvSpPr>
-        <p:spPr/>
-        <p:txBody>
-          <a:bodyPr/>
-          <a:lstStyle/>
-          <a:p>
-            <a:r>
-              <a:rPr lang="en-US" smtClean="0"/>
-              <a:t>2/10/15</a:t>
-            </a:r>
-            <a:endParaRPr lang="en-US"/>
-          </a:p>
-        </p:txBody>
-      </p:sp>
-      <p:sp>
-        <p:nvSpPr>
-          <p:cNvPr id="5" name="Slide Number Placeholder 4"/>
-          <p:cNvSpPr>
-            <a:spLocks noGrp="1"/>
-          </p:cNvSpPr>
-          <p:nvPr>
-            <p:ph type="sldNum" sz="quarter" idx="12"/>
-          </p:nvPr>
-        </p:nvSpPr>
-        <p:spPr/>
-        <p:txBody>
-          <a:bodyPr/>
-          <a:lstStyle/>
-          <a:p>
-            <a:fld id="{8A0A27A7-74DC-2A47-9D23-749C6EF32631}" type="slidenum">
-              <a:rPr lang="en-US" smtClean="0"/>
-              <a:pPr/>
-              <a:t>4</a:t>
-            </a:fld>
-            <a:endParaRPr lang="en-US"/>
-          </a:p>
-        </p:txBody>
-      </p:sp>
-      <p:sp>
-        <p:nvSpPr>
-          <p:cNvPr id="6" name="Footer Placeholder 5"/>
-          <p:cNvSpPr>
-            <a:spLocks noGrp="1"/>
-          </p:cNvSpPr>
-          <p:nvPr>
-            <p:ph type="ftr" sz="quarter" idx="11"/>
-          </p:nvPr>
-        </p:nvSpPr>
-        <p:spPr/>
-        <p:txBody>
-          <a:bodyPr/>
-          <a:lstStyle/>
-          <a:p>
-            <a:r>
-              <a:rPr lang="en-US" smtClean="0"/>
-              <a:t>Robert Nicholson</a:t>
-            </a:r>
-            <a:endParaRPr lang="en-US"/>
-          </a:p>
-        </p:txBody>
-      </p:sp>
-    </p:spTree>
-  </p:cSld>
-  <p:clrMapOvr>
-    <a:masterClrMapping/>
-  </p:clrMapOvr>
-  <p:timing>
-    <p:tnLst>
-      <p:par>
-        <p:cTn xmlns:p14="http://schemas.microsoft.com/office/powerpoint/2010/main" id="1" dur="indefinite" restart="never" nodeType="tmRoot"/>
-      </p:par>
-    </p:tnLst>
-  </p:timing>
-</p:sld>
-</file>
-
-<file path=ppt/slides/slide5.xml><?xml version="1.0" encoding="utf-8"?>
-<p:sld xmlns:a="http://schemas.openxmlformats.org/drawingml/2006/main" xmlns:r="http://schemas.openxmlformats.org/officeDocument/2006/relationships" xmlns:p="http://schemas.openxmlformats.org/presentationml/2006/main">
-  <p:cSld>
-    <p:spTree>
-      <p:nvGrpSpPr>
-        <p:cNvPr id="1" name=""/>
-        <p:cNvGrpSpPr/>
-        <p:nvPr/>
-      </p:nvGrpSpPr>
-      <p:grpSpPr>
-        <a:xfrm>
-          <a:off x="0" y="0"/>
-          <a:ext cx="0" cy="0"/>
-          <a:chOff x="0" y="0"/>
-          <a:chExt cx="0" cy="0"/>
-        </a:xfrm>
-      </p:grpSpPr>
-      <p:sp>
-        <p:nvSpPr>
-          <p:cNvPr id="2" name="Title 1"/>
-          <p:cNvSpPr>
-            <a:spLocks noGrp="1"/>
-          </p:cNvSpPr>
-          <p:nvPr>
-            <p:ph type="title"/>
-          </p:nvPr>
-        </p:nvSpPr>
         <p:spPr>
           <a:xfrm>
             <a:off x="457200" y="274638"/>
@@ -6960,11 +6071,7 @@
             </a:pPr>
             <a:r>
               <a:rPr lang="en-US" dirty="0" smtClean="0"/>
-              <a:t>Different </a:t>
-            </a:r>
-            <a:r>
-              <a:rPr lang="en-US" dirty="0" smtClean="0"/>
-              <a:t>goals</a:t>
+              <a:t>Different goals</a:t>
             </a:r>
           </a:p>
           <a:p>
@@ -6976,7 +6083,6 @@
               <a:rPr lang="en-US" dirty="0" smtClean="0"/>
               <a:t>Lack of priorities and process</a:t>
             </a:r>
-            <a:endParaRPr lang="en-US" dirty="0" smtClean="0"/>
           </a:p>
         </p:txBody>
       </p:sp>
@@ -7078,7 +6184,7 @@
             <a:fld id="{8A0A27A7-74DC-2A47-9D23-749C6EF32631}" type="slidenum">
               <a:rPr lang="en-US" smtClean="0"/>
               <a:pPr/>
-              <a:t>5</a:t>
+              <a:t>4</a:t>
             </a:fld>
             <a:endParaRPr lang="en-US"/>
           </a:p>
@@ -7115,7 +6221,188 @@
   <p:timing>
     <p:tnLst>
       <p:par>
-        <p:cTn xmlns:p14="http://schemas.microsoft.com/office/powerpoint/2010/main" id="1" dur="indefinite" restart="never" nodeType="tmRoot"/>
+        <p:cTn id="1" dur="indefinite" restart="never" nodeType="tmRoot"/>
+      </p:par>
+    </p:tnLst>
+  </p:timing>
+</p:sld>
+</file>
+
+<file path=ppt/slides/slide5.xml><?xml version="1.0" encoding="utf-8"?>
+<p:sld xmlns:a="http://schemas.openxmlformats.org/drawingml/2006/main" xmlns:r="http://schemas.openxmlformats.org/officeDocument/2006/relationships" xmlns:p="http://schemas.openxmlformats.org/presentationml/2006/main">
+  <p:cSld>
+    <p:spTree>
+      <p:nvGrpSpPr>
+        <p:cNvPr id="1" name=""/>
+        <p:cNvGrpSpPr/>
+        <p:nvPr/>
+      </p:nvGrpSpPr>
+      <p:grpSpPr>
+        <a:xfrm>
+          <a:off x="0" y="0"/>
+          <a:ext cx="0" cy="0"/>
+          <a:chOff x="0" y="0"/>
+          <a:chExt cx="0" cy="0"/>
+        </a:xfrm>
+      </p:grpSpPr>
+      <p:sp>
+        <p:nvSpPr>
+          <p:cNvPr id="2" name="Title 1"/>
+          <p:cNvSpPr>
+            <a:spLocks noGrp="1"/>
+          </p:cNvSpPr>
+          <p:nvPr>
+            <p:ph type="title"/>
+          </p:nvPr>
+        </p:nvSpPr>
+        <p:spPr/>
+        <p:txBody>
+          <a:bodyPr/>
+          <a:lstStyle/>
+          <a:p>
+            <a:r>
+              <a:rPr lang="en-US" dirty="0" smtClean="0"/>
+              <a:t>Why Requirements are WRONG (2)</a:t>
+            </a:r>
+            <a:endParaRPr lang="en-US" dirty="0"/>
+          </a:p>
+        </p:txBody>
+      </p:sp>
+      <p:sp>
+        <p:nvSpPr>
+          <p:cNvPr id="3" name="Content Placeholder 2"/>
+          <p:cNvSpPr>
+            <a:spLocks noGrp="1"/>
+          </p:cNvSpPr>
+          <p:nvPr>
+            <p:ph idx="1"/>
+          </p:nvPr>
+        </p:nvSpPr>
+        <p:spPr/>
+        <p:txBody>
+          <a:bodyPr/>
+          <a:lstStyle/>
+          <a:p>
+            <a:r>
+              <a:rPr lang="en-US" dirty="0" smtClean="0"/>
+              <a:t>Wrong Problem</a:t>
+            </a:r>
+          </a:p>
+          <a:p>
+            <a:pPr lvl="1">
+              <a:buFont typeface="Courier New"/>
+              <a:buChar char="o"/>
+            </a:pPr>
+            <a:r>
+              <a:rPr lang="en-US" dirty="0" smtClean="0"/>
+              <a:t>Focus on “Pain Points” rather than business priorities</a:t>
+            </a:r>
+          </a:p>
+          <a:p>
+            <a:pPr lvl="1">
+              <a:buFont typeface="Courier New"/>
+              <a:buChar char="o"/>
+            </a:pPr>
+            <a:r>
+              <a:rPr lang="en-US" dirty="0" smtClean="0"/>
+              <a:t>Focus on legacy systems rather than future</a:t>
+            </a:r>
+            <a:endParaRPr lang="en-US" dirty="0"/>
+          </a:p>
+          <a:p>
+            <a:pPr lvl="2">
+              <a:buFont typeface="Courier New"/>
+              <a:buChar char="o"/>
+            </a:pPr>
+            <a:r>
+              <a:rPr lang="en-US" dirty="0" smtClean="0"/>
+              <a:t>(There are always legacy systems)</a:t>
+            </a:r>
+          </a:p>
+          <a:p>
+            <a:endParaRPr lang="en-US" dirty="0"/>
+          </a:p>
+        </p:txBody>
+      </p:sp>
+      <p:sp>
+        <p:nvSpPr>
+          <p:cNvPr id="4" name="Date Placeholder 3"/>
+          <p:cNvSpPr>
+            <a:spLocks noGrp="1"/>
+          </p:cNvSpPr>
+          <p:nvPr>
+            <p:ph type="dt" sz="half" idx="10"/>
+          </p:nvPr>
+        </p:nvSpPr>
+        <p:spPr/>
+        <p:txBody>
+          <a:bodyPr/>
+          <a:lstStyle/>
+          <a:p>
+            <a:r>
+              <a:rPr lang="en-US" smtClean="0"/>
+              <a:t>2/10/15</a:t>
+            </a:r>
+            <a:endParaRPr lang="en-US"/>
+          </a:p>
+        </p:txBody>
+      </p:sp>
+      <p:sp>
+        <p:nvSpPr>
+          <p:cNvPr id="5" name="Slide Number Placeholder 4"/>
+          <p:cNvSpPr>
+            <a:spLocks noGrp="1"/>
+          </p:cNvSpPr>
+          <p:nvPr>
+            <p:ph type="sldNum" sz="quarter" idx="12"/>
+          </p:nvPr>
+        </p:nvSpPr>
+        <p:spPr/>
+        <p:txBody>
+          <a:bodyPr/>
+          <a:lstStyle/>
+          <a:p>
+            <a:fld id="{8A0A27A7-74DC-2A47-9D23-749C6EF32631}" type="slidenum">
+              <a:rPr lang="en-US" smtClean="0"/>
+              <a:pPr/>
+              <a:t>5</a:t>
+            </a:fld>
+            <a:endParaRPr lang="en-US"/>
+          </a:p>
+        </p:txBody>
+      </p:sp>
+      <p:sp>
+        <p:nvSpPr>
+          <p:cNvPr id="6" name="Footer Placeholder 5"/>
+          <p:cNvSpPr>
+            <a:spLocks noGrp="1"/>
+          </p:cNvSpPr>
+          <p:nvPr>
+            <p:ph type="ftr" sz="quarter" idx="11"/>
+          </p:nvPr>
+        </p:nvSpPr>
+        <p:spPr/>
+        <p:txBody>
+          <a:bodyPr/>
+          <a:lstStyle/>
+          <a:p>
+            <a:r>
+              <a:rPr lang="en-US" smtClean="0"/>
+              <a:t>Robert Nicholson</a:t>
+            </a:r>
+            <a:endParaRPr lang="en-US"/>
+          </a:p>
+        </p:txBody>
+      </p:sp>
+    </p:spTree>
+  </p:cSld>
+  <p:clrMapOvr>
+    <a:masterClrMapping/>
+  </p:clrMapOvr>
+  <p:timing>
+    <p:tnLst>
+      <p:par>
+        <p:cTn id="1" dur="indefinite" restart="never" nodeType="tmRoot"/>
       </p:par>
     </p:tnLst>
   </p:timing>
@@ -7151,12 +6438,14 @@
         </p:nvSpPr>
         <p:spPr/>
         <p:txBody>
-          <a:bodyPr/>
-          <a:lstStyle/>
-          <a:p>
-            <a:r>
-              <a:rPr lang="en-US" dirty="0" smtClean="0"/>
-              <a:t>Why Requirements are WRONG (2)</a:t>
+          <a:bodyPr>
+            <a:normAutofit/>
+          </a:bodyPr>
+          <a:lstStyle/>
+          <a:p>
+            <a:r>
+              <a:rPr lang="en-US" dirty="0" smtClean="0"/>
+              <a:t>Why Requirements are WRONG (3)</a:t>
             </a:r>
             <a:endParaRPr lang="en-US" dirty="0"/>
           </a:p>
@@ -7177,46 +6466,57 @@
           <a:bodyPr/>
           <a:lstStyle/>
           <a:p>
-            <a:r>
-              <a:rPr lang="en-US" dirty="0" smtClean="0"/>
-              <a:t>Wrong Problem</a:t>
+            <a:pPr lvl="0">
+              <a:defRPr/>
+            </a:pPr>
+            <a:r>
+              <a:rPr lang="en-US" dirty="0" smtClean="0"/>
+              <a:t>Copying Other Applications</a:t>
             </a:r>
           </a:p>
           <a:p>
             <a:pPr lvl="1">
               <a:buFont typeface="Courier New"/>
               <a:buChar char="o"/>
+              <a:defRPr/>
             </a:pPr>
             <a:r>
               <a:rPr lang="en-US" dirty="0" smtClean="0"/>
-              <a:t>Focus on “Pain Points” rather than business priorities</a:t>
+              <a:t>Often not appropriate</a:t>
+            </a:r>
+          </a:p>
+          <a:p>
+            <a:pPr lvl="2">
+              <a:buFont typeface="Courier New"/>
+              <a:buChar char="o"/>
+              <a:defRPr/>
+            </a:pPr>
+            <a:r>
+              <a:rPr lang="en-US" dirty="0" smtClean="0"/>
+              <a:t>Example:  selection spinner</a:t>
             </a:r>
           </a:p>
           <a:p>
             <a:pPr lvl="1">
               <a:buFont typeface="Courier New"/>
               <a:buChar char="o"/>
+              <a:defRPr/>
             </a:pPr>
             <a:r>
               <a:rPr lang="en-US" dirty="0" smtClean="0"/>
-              <a:t>Focus on legacy systems rather than </a:t>
-            </a:r>
-            <a:r>
-              <a:rPr lang="en-US" dirty="0" smtClean="0"/>
-              <a:t>future</a:t>
-            </a:r>
-            <a:endParaRPr lang="en-US" dirty="0"/>
-          </a:p>
-          <a:p>
-            <a:pPr lvl="2">
+              <a:t>Interface Pizza</a:t>
+            </a:r>
+          </a:p>
+          <a:p>
+            <a:pPr lvl="1">
               <a:buFont typeface="Courier New"/>
               <a:buChar char="o"/>
+              <a:defRPr/>
             </a:pPr>
             <a:r>
               <a:rPr lang="en-US" dirty="0" smtClean="0"/>
-              <a:t>(There are always legacy systems)</a:t>
-            </a:r>
-            <a:endParaRPr lang="en-US" dirty="0" smtClean="0"/>
+              <a:t>Backward-looking (legacy and technology*)</a:t>
+            </a:r>
           </a:p>
           <a:p>
             <a:endParaRPr lang="en-US" dirty="0"/>
@@ -7301,7 +6601,7 @@
   <p:timing>
     <p:tnLst>
       <p:par>
-        <p:cTn xmlns:p14="http://schemas.microsoft.com/office/powerpoint/2010/main" id="1" dur="indefinite" restart="never" nodeType="tmRoot"/>
+        <p:cTn id="1" dur="indefinite" restart="never" nodeType="tmRoot"/>
       </p:par>
     </p:tnLst>
   </p:timing>
@@ -7337,32 +6637,32 @@
         </p:nvSpPr>
         <p:spPr/>
         <p:txBody>
+          <a:bodyPr/>
+          <a:lstStyle/>
+          <a:p>
+            <a:r>
+              <a:rPr lang="en-US" dirty="0" smtClean="0"/>
+              <a:t>Why Requirements are WRONG (4)</a:t>
+            </a:r>
+            <a:endParaRPr lang="en-US" dirty="0"/>
+          </a:p>
+        </p:txBody>
+      </p:sp>
+      <p:sp>
+        <p:nvSpPr>
+          <p:cNvPr id="3" name="Content Placeholder 2"/>
+          <p:cNvSpPr>
+            <a:spLocks noGrp="1"/>
+          </p:cNvSpPr>
+          <p:nvPr>
+            <p:ph idx="1"/>
+          </p:nvPr>
+        </p:nvSpPr>
+        <p:spPr/>
+        <p:txBody>
           <a:bodyPr>
-            <a:normAutofit/>
+            <a:normAutofit lnSpcReduction="10000"/>
           </a:bodyPr>
-          <a:lstStyle/>
-          <a:p>
-            <a:r>
-              <a:rPr lang="en-US" dirty="0" smtClean="0"/>
-              <a:t>Why Requirements are WRONG (3)</a:t>
-            </a:r>
-            <a:endParaRPr lang="en-US" dirty="0"/>
-          </a:p>
-        </p:txBody>
-      </p:sp>
-      <p:sp>
-        <p:nvSpPr>
-          <p:cNvPr id="3" name="Content Placeholder 2"/>
-          <p:cNvSpPr>
-            <a:spLocks noGrp="1"/>
-          </p:cNvSpPr>
-          <p:nvPr>
-            <p:ph idx="1"/>
-          </p:nvPr>
-        </p:nvSpPr>
-        <p:spPr/>
-        <p:txBody>
-          <a:bodyPr/>
           <a:lstStyle/>
           <a:p>
             <a:pPr lvl="0">
@@ -7370,57 +6670,86 @@
             </a:pPr>
             <a:r>
               <a:rPr lang="en-US" dirty="0" smtClean="0"/>
-              <a:t>Copying Other Applications</a:t>
-            </a:r>
-          </a:p>
-          <a:p>
-            <a:pPr lvl="1">
+              <a:t>Lack of Technology / Industry Knowledge</a:t>
+            </a:r>
+          </a:p>
+          <a:p>
+            <a:pPr marL="800100" lvl="1" indent="-342900">
               <a:buFont typeface="Courier New"/>
               <a:buChar char="o"/>
-              <a:defRPr/>
             </a:pPr>
             <a:r>
-              <a:rPr lang="en-US" dirty="0" smtClean="0"/>
-              <a:t>Often not </a:t>
-            </a:r>
-            <a:r>
-              <a:rPr lang="en-US" dirty="0" smtClean="0"/>
-              <a:t>appropriate</a:t>
-            </a:r>
-          </a:p>
-          <a:p>
-            <a:pPr lvl="2">
+              <a:rPr lang="en-US" sz="3200" dirty="0" smtClean="0"/>
+              <a:t>(Not knowing what is possible)</a:t>
+            </a:r>
+          </a:p>
+          <a:p>
+            <a:pPr marL="800100" lvl="1" indent="-342900">
               <a:buFont typeface="Courier New"/>
               <a:buChar char="o"/>
-              <a:defRPr/>
             </a:pPr>
             <a:r>
-              <a:rPr lang="en-US" dirty="0" smtClean="0"/>
-              <a:t>Example:  selection spinner</a:t>
-            </a:r>
-            <a:endParaRPr lang="en-US" dirty="0" smtClean="0"/>
-          </a:p>
-          <a:p>
-            <a:pPr lvl="1">
+              <a:rPr lang="en-US" sz="3200" dirty="0" err="1" smtClean="0"/>
+              <a:t>Geolocation</a:t>
+            </a:r>
+            <a:endParaRPr lang="en-US" sz="3200" dirty="0" smtClean="0"/>
+          </a:p>
+          <a:p>
+            <a:pPr marL="800100" lvl="1" indent="-342900">
               <a:buFont typeface="Courier New"/>
               <a:buChar char="o"/>
-              <a:defRPr/>
             </a:pPr>
             <a:r>
-              <a:rPr lang="en-US" dirty="0" smtClean="0"/>
-              <a:t>Interface Pizza</a:t>
-            </a:r>
-          </a:p>
-          <a:p>
-            <a:pPr lvl="1">
+              <a:rPr lang="en-US" sz="3200" dirty="0" smtClean="0"/>
+              <a:t>Image recognition</a:t>
+            </a:r>
+          </a:p>
+          <a:p>
+            <a:pPr marL="800100" lvl="1" indent="-342900">
               <a:buFont typeface="Courier New"/>
               <a:buChar char="o"/>
-              <a:defRPr/>
             </a:pPr>
             <a:r>
-              <a:rPr lang="en-US" dirty="0" smtClean="0"/>
-              <a:t>Backward-looking (legacy and technology*)</a:t>
-            </a:r>
+              <a:rPr lang="en-US" sz="3200" dirty="0" smtClean="0"/>
+              <a:t>Audio Input</a:t>
+            </a:r>
+          </a:p>
+          <a:p>
+            <a:pPr marL="800100" lvl="1" indent="-342900">
+              <a:buFont typeface="Courier New"/>
+              <a:buChar char="o"/>
+            </a:pPr>
+            <a:r>
+              <a:rPr lang="en-US" sz="3200" dirty="0" smtClean="0"/>
+              <a:t>Language translation</a:t>
+            </a:r>
+          </a:p>
+          <a:p>
+            <a:pPr marL="800100" lvl="1" indent="-342900">
+              <a:buFont typeface="Courier New"/>
+              <a:buChar char="o"/>
+            </a:pPr>
+            <a:r>
+              <a:rPr lang="en-US" sz="3200" dirty="0" smtClean="0"/>
+              <a:t>Expert Systems / artificial intelligence</a:t>
+            </a:r>
+          </a:p>
+          <a:p>
+            <a:pPr marL="800100" lvl="1" indent="-342900">
+              <a:buFont typeface="Courier New"/>
+              <a:buChar char="o"/>
+            </a:pPr>
+            <a:r>
+              <a:rPr lang="en-US" sz="3200" dirty="0" smtClean="0"/>
+              <a:t>Back-end database verification services</a:t>
+            </a:r>
+          </a:p>
+          <a:p>
+            <a:pPr marL="800100" lvl="1" indent="-342900">
+              <a:buFont typeface="Courier New"/>
+              <a:buChar char="o"/>
+            </a:pPr>
+            <a:endParaRPr lang="en-US" sz="3200" dirty="0" smtClean="0"/>
           </a:p>
           <a:p>
             <a:endParaRPr lang="en-US" dirty="0"/>
@@ -7505,7 +6834,7 @@
   <p:timing>
     <p:tnLst>
       <p:par>
-        <p:cTn xmlns:p14="http://schemas.microsoft.com/office/powerpoint/2010/main" id="1" dur="indefinite" restart="never" nodeType="tmRoot"/>
+        <p:cTn id="1" dur="indefinite" restart="never" nodeType="tmRoot"/>
       </p:par>
     </p:tnLst>
   </p:timing>
@@ -7539,16 +6868,23 @@
             <p:ph type="title"/>
           </p:nvPr>
         </p:nvSpPr>
-        <p:spPr/>
-        <p:txBody>
-          <a:bodyPr/>
-          <a:lstStyle/>
-          <a:p>
-            <a:r>
-              <a:rPr lang="en-US" dirty="0" smtClean="0"/>
-              <a:t>Why Requirements are WRONG (4)</a:t>
-            </a:r>
-            <a:endParaRPr lang="en-US" dirty="0"/>
+        <p:spPr>
+          <a:xfrm>
+            <a:off x="457200" y="274638"/>
+            <a:ext cx="8229600" cy="917494"/>
+          </a:xfrm>
+        </p:spPr>
+        <p:txBody>
+          <a:bodyPr>
+            <a:normAutofit/>
+          </a:bodyPr>
+          <a:lstStyle/>
+          <a:p>
+            <a:r>
+              <a:rPr lang="en-US" dirty="0" smtClean="0"/>
+              <a:t>Getting Good Requirements (1)</a:t>
+            </a:r>
+            <a:endParaRPr lang="en-US" sz="2667" dirty="0"/>
           </a:p>
         </p:txBody>
       </p:sp>
@@ -7562,110 +6898,158 @@
             <p:ph idx="1"/>
           </p:nvPr>
         </p:nvSpPr>
-        <p:spPr/>
+        <p:spPr>
+          <a:xfrm>
+            <a:off x="457200" y="1192132"/>
+            <a:ext cx="8229600" cy="4934031"/>
+          </a:xfrm>
+        </p:spPr>
         <p:txBody>
           <a:bodyPr>
-            <a:normAutofit lnSpcReduction="10000"/>
+            <a:normAutofit fontScale="85000" lnSpcReduction="20000"/>
           </a:bodyPr>
           <a:lstStyle/>
           <a:p>
-            <a:pPr lvl="0">
-              <a:defRPr/>
+            <a:pPr marL="514350" indent="-514350">
+              <a:buFont typeface="+mj-lt"/>
+              <a:buAutoNum type="arabicPeriod"/>
             </a:pPr>
             <a:r>
               <a:rPr lang="en-US" dirty="0" smtClean="0"/>
-              <a:t>Lack of Technology / Industry Knowledge</a:t>
-            </a:r>
-          </a:p>
-          <a:p>
-            <a:pPr marL="800100" lvl="1" indent="-342900">
+              <a:t>Understand the Basics:</a:t>
+            </a:r>
+          </a:p>
+          <a:p>
+            <a:pPr lvl="1">
               <a:buFont typeface="Courier New"/>
               <a:buChar char="o"/>
             </a:pPr>
             <a:r>
-              <a:rPr lang="en-US" sz="3200" dirty="0" smtClean="0"/>
-              <a:t>(Not </a:t>
-            </a:r>
-            <a:r>
-              <a:rPr lang="en-US" sz="3200" dirty="0" smtClean="0"/>
-              <a:t>knowing what is </a:t>
-            </a:r>
-            <a:r>
-              <a:rPr lang="en-US" sz="3200" dirty="0" smtClean="0"/>
-              <a:t>possible)</a:t>
-            </a:r>
-            <a:endParaRPr lang="en-US" sz="3200" dirty="0" smtClean="0"/>
-          </a:p>
-          <a:p>
-            <a:pPr marL="800100" lvl="1" indent="-342900">
+              <a:rPr lang="en-US" dirty="0" smtClean="0"/>
+              <a:t>Use </a:t>
+            </a:r>
+            <a:r>
+              <a:rPr lang="en-US" dirty="0"/>
+              <a:t>Questionnaires or Interviews</a:t>
+            </a:r>
+          </a:p>
+          <a:p>
+            <a:pPr lvl="1">
               <a:buFont typeface="Courier New"/>
               <a:buChar char="o"/>
             </a:pPr>
             <a:r>
-              <a:rPr lang="en-US" sz="3200" dirty="0" err="1" smtClean="0"/>
-              <a:t>Geolocation</a:t>
-            </a:r>
-            <a:endParaRPr lang="en-US" sz="3200" dirty="0" smtClean="0"/>
-          </a:p>
-          <a:p>
-            <a:pPr marL="800100" lvl="1" indent="-342900">
+              <a:rPr lang="en-US" dirty="0" smtClean="0"/>
+              <a:t>Likes and Dislikes (especially useful for UI)</a:t>
+            </a:r>
+          </a:p>
+          <a:p>
+            <a:pPr lvl="1">
               <a:buFont typeface="Courier New"/>
               <a:buChar char="o"/>
             </a:pPr>
             <a:r>
-              <a:rPr lang="en-US" sz="3200" dirty="0" smtClean="0"/>
-              <a:t>Image recognition</a:t>
-            </a:r>
-          </a:p>
-          <a:p>
-            <a:pPr marL="800100" lvl="1" indent="-342900">
+              <a:rPr lang="en-US" dirty="0" smtClean="0"/>
+              <a:t>Colors and fonts (preferences, company standards)</a:t>
+            </a:r>
+          </a:p>
+          <a:p>
+            <a:pPr lvl="1">
               <a:buFont typeface="Courier New"/>
               <a:buChar char="o"/>
             </a:pPr>
             <a:r>
-              <a:rPr lang="en-US" sz="3200" dirty="0" smtClean="0"/>
-              <a:t>Audio Input</a:t>
-            </a:r>
-          </a:p>
-          <a:p>
-            <a:pPr marL="800100" lvl="1" indent="-342900">
+              <a:rPr lang="en-US" dirty="0" smtClean="0"/>
+              <a:t>“Mood” (professional, efficient, fun)</a:t>
+            </a:r>
+          </a:p>
+          <a:p>
+            <a:pPr lvl="1">
               <a:buFont typeface="Courier New"/>
               <a:buChar char="o"/>
             </a:pPr>
             <a:r>
-              <a:rPr lang="en-US" sz="3200" dirty="0" smtClean="0"/>
-              <a:t>Language translation</a:t>
-            </a:r>
-          </a:p>
-          <a:p>
-            <a:pPr marL="800100" lvl="1" indent="-342900">
+              <a:rPr lang="en-US" dirty="0" err="1" smtClean="0"/>
+              <a:t>Language(s</a:t>
+            </a:r>
+            <a:r>
+              <a:rPr lang="en-US" dirty="0" smtClean="0"/>
+              <a:t>)</a:t>
+            </a:r>
+          </a:p>
+          <a:p>
+            <a:pPr lvl="1">
               <a:buFont typeface="Courier New"/>
               <a:buChar char="o"/>
             </a:pPr>
             <a:r>
-              <a:rPr lang="en-US" sz="3200" dirty="0" smtClean="0"/>
-              <a:t>Expert Systems / artificial intelligence</a:t>
-            </a:r>
-          </a:p>
-          <a:p>
-            <a:pPr marL="800100" lvl="1" indent="-342900">
-              <a:buFont typeface="Courier New"/>
-              <a:buChar char="o"/>
+              <a:rPr lang="en-US" dirty="0" smtClean="0"/>
+              <a:t>Target Users (age</a:t>
+            </a:r>
+            <a:r>
+              <a:rPr lang="en-US" dirty="0"/>
+              <a:t>, gender</a:t>
+            </a:r>
+            <a:r>
+              <a:rPr lang="en-US" dirty="0" smtClean="0"/>
+              <a:t>, education</a:t>
+            </a:r>
+            <a:r>
+              <a:rPr lang="en-US" dirty="0"/>
+              <a:t>, </a:t>
+            </a:r>
+            <a:r>
+              <a:rPr lang="en-US" dirty="0" smtClean="0"/>
+              <a:t>training)</a:t>
+            </a:r>
+          </a:p>
+          <a:p>
+            <a:pPr marL="514350" indent="-514350">
+              <a:buFont typeface="+mj-lt"/>
+              <a:buAutoNum type="arabicPeriod"/>
             </a:pPr>
             <a:r>
-              <a:rPr lang="en-US" sz="3200" dirty="0" smtClean="0"/>
-              <a:t>Back-end database verification services</a:t>
-            </a:r>
-          </a:p>
-          <a:p>
-            <a:pPr marL="800100" lvl="1" indent="-342900">
-              <a:buFont typeface="Courier New"/>
-              <a:buChar char="o"/>
+              <a:rPr lang="en-US" dirty="0" smtClean="0"/>
+              <a:t>Review Documentation and Training Materials</a:t>
+            </a:r>
+          </a:p>
+          <a:p>
+            <a:pPr marL="514350" indent="-514350">
+              <a:buFont typeface="+mj-lt"/>
+              <a:buAutoNum type="arabicPeriod"/>
             </a:pPr>
-            <a:endParaRPr lang="en-US" sz="3200" dirty="0" smtClean="0"/>
-          </a:p>
-          <a:p>
-            <a:endParaRPr lang="en-US" dirty="0"/>
+            <a:r>
+              <a:rPr lang="en-US" dirty="0" smtClean="0"/>
+              <a:t>Engage Actual Users (understand workflow, but </a:t>
+            </a:r>
+            <a:r>
+              <a:rPr lang="en-US" i="1" dirty="0" smtClean="0"/>
+              <a:t>keep priorities in mind</a:t>
+            </a:r>
+            <a:r>
+              <a:rPr lang="en-US" dirty="0" smtClean="0"/>
+              <a:t>)</a:t>
+            </a:r>
+          </a:p>
+          <a:p>
+            <a:pPr marL="514350" indent="-514350">
+              <a:buFont typeface="+mj-lt"/>
+              <a:buAutoNum type="arabicPeriod"/>
+            </a:pPr>
+            <a:r>
+              <a:rPr lang="en-US" dirty="0" smtClean="0"/>
+              <a:t>Observe the System End-to-End</a:t>
+            </a:r>
+          </a:p>
+          <a:p>
+            <a:pPr marL="514350" indent="-514350">
+              <a:buFont typeface="+mj-lt"/>
+              <a:buAutoNum type="arabicPeriod"/>
+            </a:pPr>
+            <a:r>
+              <a:rPr lang="en-US" dirty="0" smtClean="0"/>
+              <a:t>Question, Question, Question (Why?)</a:t>
+            </a:r>
           </a:p>
         </p:txBody>
       </p:sp>
@@ -7744,13 +7128,6 @@
   <p:clrMapOvr>
     <a:masterClrMapping/>
   </p:clrMapOvr>
-  <p:timing>
-    <p:tnLst>
-      <p:par>
-        <p:cTn xmlns:p14="http://schemas.microsoft.com/office/powerpoint/2010/main" id="1" dur="indefinite" restart="never" nodeType="tmRoot"/>
-      </p:par>
-    </p:tnLst>
-  </p:timing>
 </p:sld>
 </file>
 
@@ -7781,55 +7158,39 @@
             <p:ph type="title"/>
           </p:nvPr>
         </p:nvSpPr>
-        <p:spPr>
-          <a:xfrm>
-            <a:off x="457200" y="274638"/>
-            <a:ext cx="8229600" cy="917494"/>
-          </a:xfrm>
-        </p:spPr>
+        <p:spPr/>
+        <p:txBody>
+          <a:bodyPr/>
+          <a:lstStyle/>
+          <a:p>
+            <a:r>
+              <a:rPr lang="en-US" dirty="0" smtClean="0"/>
+              <a:t>Getting Good Requirements (2)</a:t>
+            </a:r>
+            <a:endParaRPr lang="en-US" dirty="0"/>
+          </a:p>
+        </p:txBody>
+      </p:sp>
+      <p:sp>
+        <p:nvSpPr>
+          <p:cNvPr id="3" name="Content Placeholder 2"/>
+          <p:cNvSpPr>
+            <a:spLocks noGrp="1"/>
+          </p:cNvSpPr>
+          <p:nvPr>
+            <p:ph idx="1"/>
+          </p:nvPr>
+        </p:nvSpPr>
+        <p:spPr/>
         <p:txBody>
           <a:bodyPr>
-            <a:normAutofit/>
+            <a:normAutofit fontScale="70000" lnSpcReduction="20000"/>
           </a:bodyPr>
           <a:lstStyle/>
           <a:p>
             <a:r>
               <a:rPr lang="en-US" dirty="0" smtClean="0"/>
-              <a:t>Getting Good Requirements (1)</a:t>
-            </a:r>
-            <a:endParaRPr lang="en-US" sz="2667" dirty="0"/>
-          </a:p>
-        </p:txBody>
-      </p:sp>
-      <p:sp>
-        <p:nvSpPr>
-          <p:cNvPr id="3" name="Content Placeholder 2"/>
-          <p:cNvSpPr>
-            <a:spLocks noGrp="1"/>
-          </p:cNvSpPr>
-          <p:nvPr>
-            <p:ph idx="1"/>
-          </p:nvPr>
-        </p:nvSpPr>
-        <p:spPr>
-          <a:xfrm>
-            <a:off x="457200" y="1192132"/>
-            <a:ext cx="8229600" cy="4934031"/>
-          </a:xfrm>
-        </p:spPr>
-        <p:txBody>
-          <a:bodyPr>
-            <a:normAutofit fontScale="85000" lnSpcReduction="20000"/>
-          </a:bodyPr>
-          <a:lstStyle/>
-          <a:p>
-            <a:pPr marL="514350" indent="-514350">
-              <a:buFont typeface="+mj-lt"/>
-              <a:buAutoNum type="arabicPeriod"/>
-            </a:pPr>
-            <a:r>
-              <a:rPr lang="en-US" dirty="0" smtClean="0"/>
-              <a:t>Understand the Basics:</a:t>
+              <a:t>Write (or re-write) Requirements</a:t>
             </a:r>
           </a:p>
           <a:p>
@@ -7839,12 +7200,9 @@
             </a:pPr>
             <a:r>
               <a:rPr lang="en-US" dirty="0" smtClean="0"/>
-              <a:t>Use </a:t>
-            </a:r>
-            <a:r>
-              <a:rPr lang="en-US" dirty="0"/>
-              <a:t>Questionnaires or Interviews</a:t>
-            </a:r>
+              <a:t>Create Use Cases</a:t>
+            </a:r>
+            <a:endParaRPr lang="en-US" dirty="0"/>
           </a:p>
           <a:p>
             <a:pPr lvl="1">
@@ -7853,11 +7211,29 @@
             </a:pPr>
             <a:r>
               <a:rPr lang="en-US" dirty="0" smtClean="0"/>
-              <a:t>Likes </a:t>
-            </a:r>
-            <a:r>
-              <a:rPr lang="en-US" dirty="0" smtClean="0"/>
-              <a:t>and Dislikes (especially useful for UI)</a:t>
+              <a:t>Validate with Users </a:t>
+            </a:r>
+            <a:r>
+              <a:rPr lang="en-US" i="1" dirty="0" smtClean="0"/>
+              <a:t>and</a:t>
+            </a:r>
+            <a:r>
+              <a:rPr lang="en-US" dirty="0" smtClean="0"/>
+              <a:t> Decision Makers</a:t>
+            </a:r>
+          </a:p>
+          <a:p>
+            <a:r>
+              <a:rPr lang="en-US" dirty="0" smtClean="0"/>
+              <a:t>Build prototype (wireframe tools, prototyping </a:t>
+            </a:r>
+            <a:r>
+              <a:rPr lang="en-US" dirty="0"/>
+              <a:t>tools, </a:t>
+            </a:r>
+            <a:r>
+              <a:rPr lang="en-US" dirty="0" smtClean="0"/>
+              <a:t>RAD tools, web) and validate</a:t>
             </a:r>
           </a:p>
           <a:p>
@@ -7867,7 +7243,26 @@
             </a:pPr>
             <a:r>
               <a:rPr lang="en-US" dirty="0" smtClean="0"/>
-              <a:t>Colors and fonts (preferences, company standards)</a:t>
+              <a:t>May require multiple iterations</a:t>
+            </a:r>
+          </a:p>
+          <a:p>
+            <a:r>
+              <a:rPr lang="en-US" dirty="0" smtClean="0"/>
+              <a:t>Actual User Testing, A/B Testing</a:t>
+            </a:r>
+          </a:p>
+          <a:p>
+            <a:r>
+              <a:rPr lang="en-US" dirty="0" smtClean="0"/>
+              <a:t>Plan for Documentation, Help, Messages and Training</a:t>
+            </a:r>
+            <a:endParaRPr lang="en-US" dirty="0"/>
+          </a:p>
+          <a:p>
+            <a:r>
+              <a:rPr lang="en-US" dirty="0" smtClean="0"/>
+              <a:t>UI Transition Plan</a:t>
             </a:r>
           </a:p>
           <a:p>
@@ -7877,13 +7272,8 @@
             </a:pPr>
             <a:r>
               <a:rPr lang="en-US" dirty="0" smtClean="0"/>
-              <a:t>“Mood” </a:t>
-            </a:r>
-            <a:r>
-              <a:rPr lang="en-US" dirty="0" smtClean="0"/>
-              <a:t>(professional, efficient, fun)</a:t>
-            </a:r>
-            <a:endParaRPr lang="en-US" dirty="0" smtClean="0"/>
+              <a:t>Leverage Legacy Learning</a:t>
+            </a:r>
           </a:p>
           <a:p>
             <a:pPr lvl="1">
@@ -7891,12 +7281,8 @@
               <a:buChar char="o"/>
             </a:pPr>
             <a:r>
-              <a:rPr lang="en-US" dirty="0" err="1" smtClean="0"/>
-              <a:t>Language(s</a:t>
-            </a:r>
-            <a:r>
-              <a:rPr lang="en-US" dirty="0" smtClean="0"/>
-              <a:t>)</a:t>
+              <a:rPr lang="en-US" dirty="0" smtClean="0"/>
+              <a:t>Some Users Will Resist Change</a:t>
             </a:r>
           </a:p>
           <a:p>
@@ -7906,77 +7292,21 @@
             </a:pPr>
             <a:r>
               <a:rPr lang="en-US" dirty="0" smtClean="0"/>
-              <a:t>Target Users (age</a:t>
-            </a:r>
-            <a:r>
-              <a:rPr lang="en-US" dirty="0"/>
-              <a:t>, gender</a:t>
-            </a:r>
-            <a:r>
-              <a:rPr lang="en-US" dirty="0" smtClean="0"/>
-              <a:t>, education</a:t>
-            </a:r>
-            <a:r>
-              <a:rPr lang="en-US" dirty="0"/>
-              <a:t>, </a:t>
-            </a:r>
-            <a:r>
-              <a:rPr lang="en-US" dirty="0" smtClean="0"/>
-              <a:t>training)</a:t>
-            </a:r>
-          </a:p>
-          <a:p>
-            <a:pPr marL="514350" indent="-514350">
-              <a:buFont typeface="+mj-lt"/>
-              <a:buAutoNum type="arabicPeriod"/>
-            </a:pPr>
-            <a:r>
-              <a:rPr lang="en-US" dirty="0" smtClean="0"/>
-              <a:t>Review Documentation and Training Materials</a:t>
-            </a:r>
-          </a:p>
-          <a:p>
-            <a:pPr marL="514350" indent="-514350">
-              <a:buFont typeface="+mj-lt"/>
-              <a:buAutoNum type="arabicPeriod"/>
-            </a:pPr>
-            <a:r>
-              <a:rPr lang="en-US" dirty="0" smtClean="0"/>
-              <a:t>Engage Actual Users (understand workflow, but </a:t>
+              <a:t>Incremental Change Sucks!</a:t>
+            </a:r>
+          </a:p>
+          <a:p>
+            <a:r>
+              <a:rPr lang="en-US" dirty="0" smtClean="0"/>
+              <a:t>Bottom Line:  </a:t>
             </a:r>
             <a:r>
               <a:rPr lang="en-US" i="1" dirty="0" smtClean="0"/>
-              <a:t>keep priorities in mind</a:t>
-            </a:r>
-            <a:r>
-              <a:rPr lang="en-US" dirty="0" smtClean="0"/>
-              <a:t>)</a:t>
-            </a:r>
-          </a:p>
-          <a:p>
-            <a:pPr marL="514350" indent="-514350">
-              <a:buFont typeface="+mj-lt"/>
-              <a:buAutoNum type="arabicPeriod"/>
-            </a:pPr>
-            <a:r>
-              <a:rPr lang="en-US" dirty="0" smtClean="0"/>
-              <a:t>Observe the System End-to-End</a:t>
-            </a:r>
-          </a:p>
-          <a:p>
-            <a:pPr marL="514350" indent="-514350">
-              <a:buFont typeface="+mj-lt"/>
-              <a:buAutoNum type="arabicPeriod"/>
-            </a:pPr>
-            <a:r>
-              <a:rPr lang="en-US" dirty="0" smtClean="0"/>
-              <a:t>Question, Question, </a:t>
-            </a:r>
-            <a:r>
-              <a:rPr lang="en-US" dirty="0" smtClean="0"/>
-              <a:t>Question (Why?)</a:t>
-            </a:r>
-            <a:endParaRPr lang="en-US" dirty="0" smtClean="0"/>
+              <a:t>Redevelop the Requirements</a:t>
+            </a:r>
+          </a:p>
+          <a:p>
+            <a:endParaRPr lang="en-US" dirty="0"/>
           </a:p>
         </p:txBody>
       </p:sp>

</xml_diff>